<commit_message>
added ecb pseudo mode
</commit_message>
<xml_diff>
--- a/images.pptx
+++ b/images.pptx
@@ -12496,7 +12496,7 @@
                   <a:srgbClr val="FF0000"/>
                 </a:solidFill>
               </a:rPr>
-              <a:t>Key Derivation Function</a:t>
+              <a:t>Key Derivation Function (KDF)</a:t>
             </a:r>
           </a:p>
         </p:txBody>
@@ -12515,8 +12515,8 @@
         </p:nvSpPr>
         <p:spPr>
           <a:xfrm>
-            <a:off x="1131570" y="3105833"/>
-            <a:ext cx="1298176" cy="646331"/>
+            <a:off x="538705" y="3105833"/>
+            <a:ext cx="2146229" cy="646331"/>
           </a:xfrm>
           <a:prstGeom prst="rect">
             <a:avLst/>
@@ -12537,7 +12537,7 @@
           <a:p>
             <a:r>
               <a:rPr lang="en-US" b="1" dirty="0"/>
-              <a:t>Binary seed</a:t>
+              <a:t>Binary master secret</a:t>
             </a:r>
           </a:p>
         </p:txBody>
@@ -12560,8 +12560,8 @@
         </p:nvCxnSpPr>
         <p:spPr>
           <a:xfrm>
-            <a:off x="2429746" y="3428999"/>
-            <a:ext cx="1205000" cy="1"/>
+            <a:off x="2684934" y="3428999"/>
+            <a:ext cx="949812" cy="1"/>
           </a:xfrm>
           <a:prstGeom prst="straightConnector1">
             <a:avLst/>
@@ -12753,6 +12753,66 @@
           </a:p>
         </p:txBody>
       </p:sp>
+      <p:pic>
+        <p:nvPicPr>
+          <p:cNvPr id="4" name="Picture 3">
+            <a:extLst>
+              <a:ext uri="{FF2B5EF4-FFF2-40B4-BE49-F238E27FC236}">
+                <a16:creationId xmlns:a16="http://schemas.microsoft.com/office/drawing/2014/main" id="{F331907F-D621-5C47-9689-8D543707A5C5}"/>
+              </a:ext>
+            </a:extLst>
+          </p:cNvPr>
+          <p:cNvPicPr>
+            <a:picLocks noChangeAspect="1"/>
+          </p:cNvPicPr>
+          <p:nvPr/>
+        </p:nvPicPr>
+        <p:blipFill>
+          <a:blip r:embed="rId3"/>
+          <a:stretch>
+            <a:fillRect/>
+          </a:stretch>
+        </p:blipFill>
+        <p:spPr>
+          <a:xfrm>
+            <a:off x="8260883" y="3064101"/>
+            <a:ext cx="746716" cy="754080"/>
+          </a:xfrm>
+          <a:prstGeom prst="rect">
+            <a:avLst/>
+          </a:prstGeom>
+        </p:spPr>
+      </p:pic>
+      <p:pic>
+        <p:nvPicPr>
+          <p:cNvPr id="9" name="Picture 8">
+            <a:extLst>
+              <a:ext uri="{FF2B5EF4-FFF2-40B4-BE49-F238E27FC236}">
+                <a16:creationId xmlns:a16="http://schemas.microsoft.com/office/drawing/2014/main" id="{83132B70-6D52-2C46-B204-11B4F9014EE2}"/>
+              </a:ext>
+            </a:extLst>
+          </p:cNvPr>
+          <p:cNvPicPr>
+            <a:picLocks noChangeAspect="1"/>
+          </p:cNvPicPr>
+          <p:nvPr/>
+        </p:nvPicPr>
+        <p:blipFill>
+          <a:blip r:embed="rId4"/>
+          <a:stretch>
+            <a:fillRect/>
+          </a:stretch>
+        </p:blipFill>
+        <p:spPr>
+          <a:xfrm>
+            <a:off x="2280074" y="2776935"/>
+            <a:ext cx="354477" cy="652063"/>
+          </a:xfrm>
+          <a:prstGeom prst="rect">
+            <a:avLst/>
+          </a:prstGeom>
+        </p:spPr>
+      </p:pic>
     </p:spTree>
     <p:extLst>
       <p:ext uri="{BB962C8B-B14F-4D97-AF65-F5344CB8AC3E}">
@@ -15584,7 +15644,7 @@
         <p:spPr>
           <a:xfrm>
             <a:off x="1374560" y="3124002"/>
-            <a:ext cx="1365630" cy="646331"/>
+            <a:ext cx="1579600" cy="646331"/>
           </a:xfrm>
           <a:prstGeom prst="rect">
             <a:avLst/>
@@ -15605,8 +15665,13 @@
           <a:p>
             <a:r>
               <a:rPr lang="en-US" dirty="0"/>
-              <a:t>/Binary seed</a:t>
-            </a:r>
+              <a:t>/</a:t>
+            </a:r>
+            <a:r>
+              <a:rPr lang="en-US"/>
+              <a:t>Master Secret</a:t>
+            </a:r>
+            <a:endParaRPr lang="en-US" dirty="0"/>
           </a:p>
         </p:txBody>
       </p:sp>
@@ -15651,20 +15716,12 @@
           <a:p>
             <a:pPr algn="ctr"/>
             <a:r>
-              <a:rPr lang="en-US">
-                <a:solidFill>
-                  <a:srgbClr val="FF0000"/>
-                </a:solidFill>
-              </a:rPr>
-              <a:t>256bits </a:t>
-            </a:r>
-            <a:r>
               <a:rPr lang="en-US" dirty="0">
                 <a:solidFill>
                   <a:srgbClr val="FF0000"/>
                 </a:solidFill>
               </a:rPr>
-              <a:t>Key Derivation Function</a:t>
+              <a:t>256bits Key Derivation Function</a:t>
             </a:r>
           </a:p>
         </p:txBody>
@@ -15884,51 +15941,948 @@
       </p:grpSpPr>
       <p:sp>
         <p:nvSpPr>
-          <p:cNvPr id="2" name="Title 1">
-            <a:extLst>
-              <a:ext uri="{FF2B5EF4-FFF2-40B4-BE49-F238E27FC236}">
-                <a16:creationId xmlns:a16="http://schemas.microsoft.com/office/drawing/2014/main" id="{2FB1BBB2-11AF-F04F-A80E-CA34B0067B6F}"/>
-              </a:ext>
-            </a:extLst>
-          </p:cNvPr>
-          <p:cNvSpPr>
-            <a:spLocks noGrp="1"/>
-          </p:cNvSpPr>
-          <p:nvPr>
-            <p:ph type="title"/>
-          </p:nvPr>
-        </p:nvSpPr>
-        <p:spPr/>
-        <p:txBody>
-          <a:bodyPr/>
-          <a:lstStyle/>
-          <a:p>
-            <a:endParaRPr lang="en-US"/>
-          </a:p>
-        </p:txBody>
-      </p:sp>
-      <p:sp>
-        <p:nvSpPr>
-          <p:cNvPr id="3" name="Content Placeholder 2">
-            <a:extLst>
-              <a:ext uri="{FF2B5EF4-FFF2-40B4-BE49-F238E27FC236}">
-                <a16:creationId xmlns:a16="http://schemas.microsoft.com/office/drawing/2014/main" id="{CA318378-D506-E34A-BD73-F04089955F4C}"/>
-              </a:ext>
-            </a:extLst>
-          </p:cNvPr>
-          <p:cNvSpPr>
-            <a:spLocks noGrp="1"/>
-          </p:cNvSpPr>
-          <p:nvPr>
-            <p:ph idx="1"/>
-          </p:nvPr>
-        </p:nvSpPr>
-        <p:spPr/>
-        <p:txBody>
-          <a:bodyPr/>
-          <a:lstStyle/>
-          <a:p>
-            <a:endParaRPr lang="en-US"/>
+          <p:cNvPr id="5" name="Rectangle 4">
+            <a:extLst>
+              <a:ext uri="{FF2B5EF4-FFF2-40B4-BE49-F238E27FC236}">
+                <a16:creationId xmlns:a16="http://schemas.microsoft.com/office/drawing/2014/main" id="{363799BB-89AA-B646-B8E1-C6F0C10DA2D5}"/>
+              </a:ext>
+            </a:extLst>
+          </p:cNvPr>
+          <p:cNvSpPr/>
+          <p:nvPr/>
+        </p:nvSpPr>
+        <p:spPr>
+          <a:xfrm>
+            <a:off x="4073236" y="1781298"/>
+            <a:ext cx="2291938" cy="1096718"/>
+          </a:xfrm>
+          <a:prstGeom prst="rect">
+            <a:avLst/>
+          </a:prstGeom>
+          <a:noFill/>
+          <a:ln w="38100">
+            <a:solidFill>
+              <a:schemeClr val="tx1"/>
+            </a:solidFill>
+          </a:ln>
+        </p:spPr>
+        <p:style>
+          <a:lnRef idx="2">
+            <a:schemeClr val="accent1">
+              <a:shade val="50000"/>
+            </a:schemeClr>
+          </a:lnRef>
+          <a:fillRef idx="1">
+            <a:schemeClr val="accent1"/>
+          </a:fillRef>
+          <a:effectRef idx="0">
+            <a:schemeClr val="accent1"/>
+          </a:effectRef>
+          <a:fontRef idx="minor">
+            <a:schemeClr val="lt1"/>
+          </a:fontRef>
+        </p:style>
+        <p:txBody>
+          <a:bodyPr rtlCol="0" anchor="ctr"/>
+          <a:lstStyle/>
+          <a:p>
+            <a:r>
+              <a:rPr lang="en-US" b="1" dirty="0">
+                <a:solidFill>
+                  <a:srgbClr val="FF0000"/>
+                </a:solidFill>
+              </a:rPr>
+              <a:t>Password-based Key Derivation Function 2 (PBKDF2, RFC8018)</a:t>
+            </a:r>
+          </a:p>
+        </p:txBody>
+      </p:sp>
+      <p:cxnSp>
+        <p:nvCxnSpPr>
+          <p:cNvPr id="8" name="Straight Arrow Connector 7">
+            <a:extLst>
+              <a:ext uri="{FF2B5EF4-FFF2-40B4-BE49-F238E27FC236}">
+                <a16:creationId xmlns:a16="http://schemas.microsoft.com/office/drawing/2014/main" id="{7AF13B87-5584-884F-B62A-60505ADC4CF0}"/>
+              </a:ext>
+            </a:extLst>
+          </p:cNvPr>
+          <p:cNvCxnSpPr>
+            <a:cxnSpLocks/>
+          </p:cNvCxnSpPr>
+          <p:nvPr/>
+        </p:nvCxnSpPr>
+        <p:spPr>
+          <a:xfrm>
+            <a:off x="3348842" y="1977241"/>
+            <a:ext cx="724394" cy="0"/>
+          </a:xfrm>
+          <a:prstGeom prst="straightConnector1">
+            <a:avLst/>
+          </a:prstGeom>
+          <a:ln w="38100">
+            <a:solidFill>
+              <a:schemeClr val="tx1"/>
+            </a:solidFill>
+            <a:tailEnd type="triangle"/>
+          </a:ln>
+        </p:spPr>
+        <p:style>
+          <a:lnRef idx="1">
+            <a:schemeClr val="accent1"/>
+          </a:lnRef>
+          <a:fillRef idx="0">
+            <a:schemeClr val="accent1"/>
+          </a:fillRef>
+          <a:effectRef idx="0">
+            <a:schemeClr val="accent1"/>
+          </a:effectRef>
+          <a:fontRef idx="minor">
+            <a:schemeClr val="tx1"/>
+          </a:fontRef>
+        </p:style>
+      </p:cxnSp>
+      <p:sp>
+        <p:nvSpPr>
+          <p:cNvPr id="10" name="TextBox 9">
+            <a:extLst>
+              <a:ext uri="{FF2B5EF4-FFF2-40B4-BE49-F238E27FC236}">
+                <a16:creationId xmlns:a16="http://schemas.microsoft.com/office/drawing/2014/main" id="{B0F7B401-03FD-D041-986B-7C49A760F620}"/>
+              </a:ext>
+            </a:extLst>
+          </p:cNvPr>
+          <p:cNvSpPr txBox="1"/>
+          <p:nvPr/>
+        </p:nvSpPr>
+        <p:spPr>
+          <a:xfrm>
+            <a:off x="2277843" y="1781298"/>
+            <a:ext cx="1094402" cy="369332"/>
+          </a:xfrm>
+          <a:prstGeom prst="rect">
+            <a:avLst/>
+          </a:prstGeom>
+          <a:noFill/>
+        </p:spPr>
+        <p:txBody>
+          <a:bodyPr wrap="none" rtlCol="0">
+            <a:spAutoFit/>
+          </a:bodyPr>
+          <a:lstStyle/>
+          <a:p>
+            <a:r>
+              <a:rPr lang="en-US" b="1" dirty="0"/>
+              <a:t>Password</a:t>
+            </a:r>
+          </a:p>
+        </p:txBody>
+      </p:sp>
+      <p:sp>
+        <p:nvSpPr>
+          <p:cNvPr id="11" name="TextBox 10">
+            <a:extLst>
+              <a:ext uri="{FF2B5EF4-FFF2-40B4-BE49-F238E27FC236}">
+                <a16:creationId xmlns:a16="http://schemas.microsoft.com/office/drawing/2014/main" id="{B290549A-A7AE-974C-A308-E48DFB804542}"/>
+              </a:ext>
+            </a:extLst>
+          </p:cNvPr>
+          <p:cNvSpPr txBox="1"/>
+          <p:nvPr/>
+        </p:nvSpPr>
+        <p:spPr>
+          <a:xfrm>
+            <a:off x="2001386" y="2158730"/>
+            <a:ext cx="1542410" cy="369332"/>
+          </a:xfrm>
+          <a:prstGeom prst="rect">
+            <a:avLst/>
+          </a:prstGeom>
+          <a:noFill/>
+        </p:spPr>
+        <p:txBody>
+          <a:bodyPr wrap="square" rtlCol="0">
+            <a:spAutoFit/>
+          </a:bodyPr>
+          <a:lstStyle/>
+          <a:p>
+            <a:r>
+              <a:rPr lang="en-US" b="1" dirty="0">
+                <a:solidFill>
+                  <a:srgbClr val="0070C0"/>
+                </a:solidFill>
+              </a:rPr>
+              <a:t>Random Salt</a:t>
+            </a:r>
+          </a:p>
+        </p:txBody>
+      </p:sp>
+      <p:cxnSp>
+        <p:nvCxnSpPr>
+          <p:cNvPr id="12" name="Straight Arrow Connector 11">
+            <a:extLst>
+              <a:ext uri="{FF2B5EF4-FFF2-40B4-BE49-F238E27FC236}">
+                <a16:creationId xmlns:a16="http://schemas.microsoft.com/office/drawing/2014/main" id="{512F1952-CF4E-C64C-B202-58A365FDE485}"/>
+              </a:ext>
+            </a:extLst>
+          </p:cNvPr>
+          <p:cNvCxnSpPr>
+            <a:cxnSpLocks/>
+          </p:cNvCxnSpPr>
+          <p:nvPr/>
+        </p:nvCxnSpPr>
+        <p:spPr>
+          <a:xfrm>
+            <a:off x="3348842" y="2335296"/>
+            <a:ext cx="724394" cy="0"/>
+          </a:xfrm>
+          <a:prstGeom prst="straightConnector1">
+            <a:avLst/>
+          </a:prstGeom>
+          <a:ln w="38100">
+            <a:solidFill>
+              <a:schemeClr val="tx1"/>
+            </a:solidFill>
+            <a:tailEnd type="triangle"/>
+          </a:ln>
+        </p:spPr>
+        <p:style>
+          <a:lnRef idx="1">
+            <a:schemeClr val="accent1"/>
+          </a:lnRef>
+          <a:fillRef idx="0">
+            <a:schemeClr val="accent1"/>
+          </a:fillRef>
+          <a:effectRef idx="0">
+            <a:schemeClr val="accent1"/>
+          </a:effectRef>
+          <a:fontRef idx="minor">
+            <a:schemeClr val="tx1"/>
+          </a:fontRef>
+        </p:style>
+      </p:cxnSp>
+      <p:cxnSp>
+        <p:nvCxnSpPr>
+          <p:cNvPr id="15" name="Straight Arrow Connector 14">
+            <a:extLst>
+              <a:ext uri="{FF2B5EF4-FFF2-40B4-BE49-F238E27FC236}">
+                <a16:creationId xmlns:a16="http://schemas.microsoft.com/office/drawing/2014/main" id="{8DC0311C-0A1B-C940-95BC-493EF4EA356A}"/>
+              </a:ext>
+            </a:extLst>
+          </p:cNvPr>
+          <p:cNvCxnSpPr>
+            <a:cxnSpLocks/>
+          </p:cNvCxnSpPr>
+          <p:nvPr/>
+        </p:nvCxnSpPr>
+        <p:spPr>
+          <a:xfrm>
+            <a:off x="3348842" y="2693350"/>
+            <a:ext cx="724394" cy="0"/>
+          </a:xfrm>
+          <a:prstGeom prst="straightConnector1">
+            <a:avLst/>
+          </a:prstGeom>
+          <a:ln w="38100">
+            <a:solidFill>
+              <a:schemeClr val="tx1"/>
+            </a:solidFill>
+            <a:tailEnd type="triangle"/>
+          </a:ln>
+        </p:spPr>
+        <p:style>
+          <a:lnRef idx="1">
+            <a:schemeClr val="accent1"/>
+          </a:lnRef>
+          <a:fillRef idx="0">
+            <a:schemeClr val="accent1"/>
+          </a:fillRef>
+          <a:effectRef idx="0">
+            <a:schemeClr val="accent1"/>
+          </a:effectRef>
+          <a:fontRef idx="minor">
+            <a:schemeClr val="tx1"/>
+          </a:fontRef>
+        </p:style>
+      </p:cxnSp>
+      <p:sp>
+        <p:nvSpPr>
+          <p:cNvPr id="16" name="TextBox 15">
+            <a:extLst>
+              <a:ext uri="{FF2B5EF4-FFF2-40B4-BE49-F238E27FC236}">
+                <a16:creationId xmlns:a16="http://schemas.microsoft.com/office/drawing/2014/main" id="{3ABE71A3-9938-3F41-AAF0-973F1188A204}"/>
+              </a:ext>
+            </a:extLst>
+          </p:cNvPr>
+          <p:cNvSpPr txBox="1"/>
+          <p:nvPr/>
+        </p:nvSpPr>
+        <p:spPr>
+          <a:xfrm>
+            <a:off x="1795468" y="2508684"/>
+            <a:ext cx="1632883" cy="369332"/>
+          </a:xfrm>
+          <a:prstGeom prst="rect">
+            <a:avLst/>
+          </a:prstGeom>
+          <a:noFill/>
+        </p:spPr>
+        <p:txBody>
+          <a:bodyPr wrap="none" rtlCol="0">
+            <a:spAutoFit/>
+          </a:bodyPr>
+          <a:lstStyle/>
+          <a:p>
+            <a:r>
+              <a:rPr lang="en-US" b="1" dirty="0">
+                <a:solidFill>
+                  <a:srgbClr val="0070C0"/>
+                </a:solidFill>
+              </a:rPr>
+              <a:t>Iteration Count</a:t>
+            </a:r>
+          </a:p>
+        </p:txBody>
+      </p:sp>
+      <p:sp>
+        <p:nvSpPr>
+          <p:cNvPr id="17" name="TextBox 16">
+            <a:extLst>
+              <a:ext uri="{FF2B5EF4-FFF2-40B4-BE49-F238E27FC236}">
+                <a16:creationId xmlns:a16="http://schemas.microsoft.com/office/drawing/2014/main" id="{CF0F6550-1E9C-AE45-9B04-28298C866978}"/>
+              </a:ext>
+            </a:extLst>
+          </p:cNvPr>
+          <p:cNvSpPr txBox="1"/>
+          <p:nvPr/>
+        </p:nvSpPr>
+        <p:spPr>
+          <a:xfrm>
+            <a:off x="7204417" y="2132402"/>
+            <a:ext cx="529440" cy="369332"/>
+          </a:xfrm>
+          <a:prstGeom prst="rect">
+            <a:avLst/>
+          </a:prstGeom>
+          <a:noFill/>
+        </p:spPr>
+        <p:txBody>
+          <a:bodyPr wrap="none" rtlCol="0">
+            <a:spAutoFit/>
+          </a:bodyPr>
+          <a:lstStyle/>
+          <a:p>
+            <a:r>
+              <a:rPr lang="en-US" b="1" dirty="0"/>
+              <a:t>Key</a:t>
+            </a:r>
+          </a:p>
+        </p:txBody>
+      </p:sp>
+      <p:cxnSp>
+        <p:nvCxnSpPr>
+          <p:cNvPr id="18" name="Straight Arrow Connector 17">
+            <a:extLst>
+              <a:ext uri="{FF2B5EF4-FFF2-40B4-BE49-F238E27FC236}">
+                <a16:creationId xmlns:a16="http://schemas.microsoft.com/office/drawing/2014/main" id="{1ED23594-1652-CC4E-9C82-0A4784E1BCF0}"/>
+              </a:ext>
+            </a:extLst>
+          </p:cNvPr>
+          <p:cNvCxnSpPr>
+            <a:cxnSpLocks/>
+            <a:stCxn id="5" idx="3"/>
+          </p:cNvCxnSpPr>
+          <p:nvPr/>
+        </p:nvCxnSpPr>
+        <p:spPr>
+          <a:xfrm>
+            <a:off x="6365174" y="2329657"/>
+            <a:ext cx="839243" cy="0"/>
+          </a:xfrm>
+          <a:prstGeom prst="straightConnector1">
+            <a:avLst/>
+          </a:prstGeom>
+          <a:ln w="38100">
+            <a:solidFill>
+              <a:schemeClr val="tx1"/>
+            </a:solidFill>
+            <a:tailEnd type="triangle"/>
+          </a:ln>
+        </p:spPr>
+        <p:style>
+          <a:lnRef idx="1">
+            <a:schemeClr val="accent1"/>
+          </a:lnRef>
+          <a:fillRef idx="0">
+            <a:schemeClr val="accent1"/>
+          </a:fillRef>
+          <a:effectRef idx="0">
+            <a:schemeClr val="accent1"/>
+          </a:effectRef>
+          <a:fontRef idx="minor">
+            <a:schemeClr val="tx1"/>
+          </a:fontRef>
+        </p:style>
+      </p:cxnSp>
+      <p:sp>
+        <p:nvSpPr>
+          <p:cNvPr id="20" name="Rectangle 19">
+            <a:extLst>
+              <a:ext uri="{FF2B5EF4-FFF2-40B4-BE49-F238E27FC236}">
+                <a16:creationId xmlns:a16="http://schemas.microsoft.com/office/drawing/2014/main" id="{302D6F6D-20CF-3E4A-AFA2-99969E817C5D}"/>
+              </a:ext>
+            </a:extLst>
+          </p:cNvPr>
+          <p:cNvSpPr/>
+          <p:nvPr/>
+        </p:nvSpPr>
+        <p:spPr>
+          <a:xfrm>
+            <a:off x="4073236" y="4164650"/>
+            <a:ext cx="2291938" cy="1096718"/>
+          </a:xfrm>
+          <a:prstGeom prst="rect">
+            <a:avLst/>
+          </a:prstGeom>
+          <a:noFill/>
+          <a:ln w="38100">
+            <a:solidFill>
+              <a:schemeClr val="tx1"/>
+            </a:solidFill>
+          </a:ln>
+        </p:spPr>
+        <p:style>
+          <a:lnRef idx="2">
+            <a:schemeClr val="accent1">
+              <a:shade val="50000"/>
+            </a:schemeClr>
+          </a:lnRef>
+          <a:fillRef idx="1">
+            <a:schemeClr val="accent1"/>
+          </a:fillRef>
+          <a:effectRef idx="0">
+            <a:schemeClr val="accent1"/>
+          </a:effectRef>
+          <a:fontRef idx="minor">
+            <a:schemeClr val="lt1"/>
+          </a:fontRef>
+        </p:style>
+        <p:txBody>
+          <a:bodyPr rtlCol="0" anchor="ctr"/>
+          <a:lstStyle/>
+          <a:p>
+            <a:r>
+              <a:rPr lang="en-US" b="1" dirty="0">
+                <a:solidFill>
+                  <a:srgbClr val="FF0000"/>
+                </a:solidFill>
+              </a:rPr>
+              <a:t>Hash-based Key Derivation Function 2 (HKDF, RFC5869)</a:t>
+            </a:r>
+          </a:p>
+        </p:txBody>
+      </p:sp>
+      <p:cxnSp>
+        <p:nvCxnSpPr>
+          <p:cNvPr id="21" name="Straight Arrow Connector 20">
+            <a:extLst>
+              <a:ext uri="{FF2B5EF4-FFF2-40B4-BE49-F238E27FC236}">
+                <a16:creationId xmlns:a16="http://schemas.microsoft.com/office/drawing/2014/main" id="{F8B48A83-01D1-234F-A8A2-79F31A90E6AE}"/>
+              </a:ext>
+            </a:extLst>
+          </p:cNvPr>
+          <p:cNvCxnSpPr>
+            <a:cxnSpLocks/>
+          </p:cNvCxnSpPr>
+          <p:nvPr/>
+        </p:nvCxnSpPr>
+        <p:spPr>
+          <a:xfrm>
+            <a:off x="3348842" y="4527031"/>
+            <a:ext cx="724394" cy="0"/>
+          </a:xfrm>
+          <a:prstGeom prst="straightConnector1">
+            <a:avLst/>
+          </a:prstGeom>
+          <a:ln w="38100">
+            <a:solidFill>
+              <a:schemeClr val="tx1"/>
+            </a:solidFill>
+            <a:tailEnd type="triangle"/>
+          </a:ln>
+        </p:spPr>
+        <p:style>
+          <a:lnRef idx="1">
+            <a:schemeClr val="accent1"/>
+          </a:lnRef>
+          <a:fillRef idx="0">
+            <a:schemeClr val="accent1"/>
+          </a:fillRef>
+          <a:effectRef idx="0">
+            <a:schemeClr val="accent1"/>
+          </a:effectRef>
+          <a:fontRef idx="minor">
+            <a:schemeClr val="tx1"/>
+          </a:fontRef>
+        </p:style>
+      </p:cxnSp>
+      <p:sp>
+        <p:nvSpPr>
+          <p:cNvPr id="22" name="TextBox 21">
+            <a:extLst>
+              <a:ext uri="{FF2B5EF4-FFF2-40B4-BE49-F238E27FC236}">
+                <a16:creationId xmlns:a16="http://schemas.microsoft.com/office/drawing/2014/main" id="{10BDFA6E-3FA0-5A42-832A-3A6B0012B716}"/>
+              </a:ext>
+            </a:extLst>
+          </p:cNvPr>
+          <p:cNvSpPr txBox="1"/>
+          <p:nvPr/>
+        </p:nvSpPr>
+        <p:spPr>
+          <a:xfrm>
+            <a:off x="1911911" y="4325450"/>
+            <a:ext cx="1510413" cy="369332"/>
+          </a:xfrm>
+          <a:prstGeom prst="rect">
+            <a:avLst/>
+          </a:prstGeom>
+          <a:noFill/>
+        </p:spPr>
+        <p:txBody>
+          <a:bodyPr wrap="none" rtlCol="0">
+            <a:spAutoFit/>
+          </a:bodyPr>
+          <a:lstStyle/>
+          <a:p>
+            <a:r>
+              <a:rPr lang="en-US" b="1" dirty="0"/>
+              <a:t>Master Secret</a:t>
+            </a:r>
+          </a:p>
+        </p:txBody>
+      </p:sp>
+      <p:sp>
+        <p:nvSpPr>
+          <p:cNvPr id="23" name="TextBox 22">
+            <a:extLst>
+              <a:ext uri="{FF2B5EF4-FFF2-40B4-BE49-F238E27FC236}">
+                <a16:creationId xmlns:a16="http://schemas.microsoft.com/office/drawing/2014/main" id="{7C0F0558-8AA9-EC45-87BF-7FC11A64D420}"/>
+              </a:ext>
+            </a:extLst>
+          </p:cNvPr>
+          <p:cNvSpPr txBox="1"/>
+          <p:nvPr/>
+        </p:nvSpPr>
+        <p:spPr>
+          <a:xfrm>
+            <a:off x="2009060" y="4722445"/>
+            <a:ext cx="1398140" cy="369332"/>
+          </a:xfrm>
+          <a:prstGeom prst="rect">
+            <a:avLst/>
+          </a:prstGeom>
+          <a:noFill/>
+        </p:spPr>
+        <p:txBody>
+          <a:bodyPr wrap="none" rtlCol="0">
+            <a:spAutoFit/>
+          </a:bodyPr>
+          <a:lstStyle/>
+          <a:p>
+            <a:r>
+              <a:rPr lang="en-US" b="1" dirty="0">
+                <a:solidFill>
+                  <a:srgbClr val="0070C0"/>
+                </a:solidFill>
+              </a:rPr>
+              <a:t>Random Salt</a:t>
+            </a:r>
+          </a:p>
+        </p:txBody>
+      </p:sp>
+      <p:cxnSp>
+        <p:nvCxnSpPr>
+          <p:cNvPr id="24" name="Straight Arrow Connector 23">
+            <a:extLst>
+              <a:ext uri="{FF2B5EF4-FFF2-40B4-BE49-F238E27FC236}">
+                <a16:creationId xmlns:a16="http://schemas.microsoft.com/office/drawing/2014/main" id="{7BCCB7C0-8D61-854E-906D-0B176FF2941A}"/>
+              </a:ext>
+            </a:extLst>
+          </p:cNvPr>
+          <p:cNvCxnSpPr>
+            <a:cxnSpLocks/>
+          </p:cNvCxnSpPr>
+          <p:nvPr/>
+        </p:nvCxnSpPr>
+        <p:spPr>
+          <a:xfrm>
+            <a:off x="3348842" y="4885086"/>
+            <a:ext cx="724394" cy="0"/>
+          </a:xfrm>
+          <a:prstGeom prst="straightConnector1">
+            <a:avLst/>
+          </a:prstGeom>
+          <a:ln w="38100">
+            <a:solidFill>
+              <a:schemeClr val="tx1"/>
+            </a:solidFill>
+            <a:tailEnd type="triangle"/>
+          </a:ln>
+        </p:spPr>
+        <p:style>
+          <a:lnRef idx="1">
+            <a:schemeClr val="accent1"/>
+          </a:lnRef>
+          <a:fillRef idx="0">
+            <a:schemeClr val="accent1"/>
+          </a:fillRef>
+          <a:effectRef idx="0">
+            <a:schemeClr val="accent1"/>
+          </a:effectRef>
+          <a:fontRef idx="minor">
+            <a:schemeClr val="tx1"/>
+          </a:fontRef>
+        </p:style>
+      </p:cxnSp>
+      <p:sp>
+        <p:nvSpPr>
+          <p:cNvPr id="27" name="TextBox 26">
+            <a:extLst>
+              <a:ext uri="{FF2B5EF4-FFF2-40B4-BE49-F238E27FC236}">
+                <a16:creationId xmlns:a16="http://schemas.microsoft.com/office/drawing/2014/main" id="{8A642610-5428-6B4C-96C4-214EDB282111}"/>
+              </a:ext>
+            </a:extLst>
+          </p:cNvPr>
+          <p:cNvSpPr txBox="1"/>
+          <p:nvPr/>
+        </p:nvSpPr>
+        <p:spPr>
+          <a:xfrm>
+            <a:off x="7204417" y="4515754"/>
+            <a:ext cx="529440" cy="369332"/>
+          </a:xfrm>
+          <a:prstGeom prst="rect">
+            <a:avLst/>
+          </a:prstGeom>
+          <a:noFill/>
+        </p:spPr>
+        <p:txBody>
+          <a:bodyPr wrap="none" rtlCol="0">
+            <a:spAutoFit/>
+          </a:bodyPr>
+          <a:lstStyle/>
+          <a:p>
+            <a:r>
+              <a:rPr lang="en-US" b="1" dirty="0"/>
+              <a:t>Key</a:t>
+            </a:r>
+          </a:p>
+        </p:txBody>
+      </p:sp>
+      <p:cxnSp>
+        <p:nvCxnSpPr>
+          <p:cNvPr id="28" name="Straight Arrow Connector 27">
+            <a:extLst>
+              <a:ext uri="{FF2B5EF4-FFF2-40B4-BE49-F238E27FC236}">
+                <a16:creationId xmlns:a16="http://schemas.microsoft.com/office/drawing/2014/main" id="{2442E93A-0ADA-EA43-A7F5-99ED4851C109}"/>
+              </a:ext>
+            </a:extLst>
+          </p:cNvPr>
+          <p:cNvCxnSpPr>
+            <a:cxnSpLocks/>
+            <a:stCxn id="20" idx="3"/>
+          </p:cNvCxnSpPr>
+          <p:nvPr/>
+        </p:nvCxnSpPr>
+        <p:spPr>
+          <a:xfrm>
+            <a:off x="6365174" y="4713009"/>
+            <a:ext cx="839243" cy="0"/>
+          </a:xfrm>
+          <a:prstGeom prst="straightConnector1">
+            <a:avLst/>
+          </a:prstGeom>
+          <a:ln w="38100">
+            <a:solidFill>
+              <a:schemeClr val="tx1"/>
+            </a:solidFill>
+            <a:tailEnd type="triangle"/>
+          </a:ln>
+        </p:spPr>
+        <p:style>
+          <a:lnRef idx="1">
+            <a:schemeClr val="accent1"/>
+          </a:lnRef>
+          <a:fillRef idx="0">
+            <a:schemeClr val="accent1"/>
+          </a:fillRef>
+          <a:effectRef idx="0">
+            <a:schemeClr val="accent1"/>
+          </a:effectRef>
+          <a:fontRef idx="minor">
+            <a:schemeClr val="tx1"/>
+          </a:fontRef>
+        </p:style>
+      </p:cxnSp>
+      <p:sp>
+        <p:nvSpPr>
+          <p:cNvPr id="29" name="Line Callout 2 (No Border) 28">
+            <a:extLst>
+              <a:ext uri="{FF2B5EF4-FFF2-40B4-BE49-F238E27FC236}">
+                <a16:creationId xmlns:a16="http://schemas.microsoft.com/office/drawing/2014/main" id="{FBEDE9C2-8CEB-DA40-A6B9-68A89BC66351}"/>
+              </a:ext>
+            </a:extLst>
+          </p:cNvPr>
+          <p:cNvSpPr/>
+          <p:nvPr/>
+        </p:nvSpPr>
+        <p:spPr>
+          <a:xfrm>
+            <a:off x="6784795" y="1039218"/>
+            <a:ext cx="3914873" cy="753951"/>
+          </a:xfrm>
+          <a:prstGeom prst="callout2">
+            <a:avLst/>
+          </a:prstGeom>
+          <a:noFill/>
+        </p:spPr>
+        <p:style>
+          <a:lnRef idx="2">
+            <a:schemeClr val="accent1">
+              <a:shade val="50000"/>
+            </a:schemeClr>
+          </a:lnRef>
+          <a:fillRef idx="1">
+            <a:schemeClr val="accent1"/>
+          </a:fillRef>
+          <a:effectRef idx="0">
+            <a:schemeClr val="accent1"/>
+          </a:effectRef>
+          <a:fontRef idx="minor">
+            <a:schemeClr val="lt1"/>
+          </a:fontRef>
+        </p:style>
+        <p:txBody>
+          <a:bodyPr rtlCol="0" anchor="ctr"/>
+          <a:lstStyle/>
+          <a:p>
+            <a:r>
+              <a:rPr lang="en-US" dirty="0">
+                <a:solidFill>
+                  <a:schemeClr val="tx1"/>
+                </a:solidFill>
+              </a:rPr>
+              <a:t>NOTE: This involves large computational cost to increase the attack cost. This also guarantees the forward secrecy.</a:t>
+            </a:r>
+          </a:p>
+        </p:txBody>
+      </p:sp>
+      <p:sp>
+        <p:nvSpPr>
+          <p:cNvPr id="30" name="Line Callout 2 (No Border) 29">
+            <a:extLst>
+              <a:ext uri="{FF2B5EF4-FFF2-40B4-BE49-F238E27FC236}">
+                <a16:creationId xmlns:a16="http://schemas.microsoft.com/office/drawing/2014/main" id="{0E3EC175-75FB-1046-99A8-AF7C6D701915}"/>
+              </a:ext>
+            </a:extLst>
+          </p:cNvPr>
+          <p:cNvSpPr/>
+          <p:nvPr/>
+        </p:nvSpPr>
+        <p:spPr>
+          <a:xfrm>
+            <a:off x="6936574" y="3422569"/>
+            <a:ext cx="4428111" cy="753951"/>
+          </a:xfrm>
+          <a:prstGeom prst="callout2">
+            <a:avLst/>
+          </a:prstGeom>
+          <a:noFill/>
+        </p:spPr>
+        <p:style>
+          <a:lnRef idx="2">
+            <a:schemeClr val="accent1">
+              <a:shade val="50000"/>
+            </a:schemeClr>
+          </a:lnRef>
+          <a:fillRef idx="1">
+            <a:schemeClr val="accent1"/>
+          </a:fillRef>
+          <a:effectRef idx="0">
+            <a:schemeClr val="accent1"/>
+          </a:effectRef>
+          <a:fontRef idx="minor">
+            <a:schemeClr val="lt1"/>
+          </a:fontRef>
+        </p:style>
+        <p:txBody>
+          <a:bodyPr rtlCol="0" anchor="ctr"/>
+          <a:lstStyle/>
+          <a:p>
+            <a:r>
+              <a:rPr lang="en-US" dirty="0">
+                <a:solidFill>
+                  <a:schemeClr val="tx1"/>
+                </a:solidFill>
+              </a:rPr>
+              <a:t>NOTE: This assumes a relatively long-enough master secret like &gt; 80 bits. This is employed mainly to guarantee the forward secrecy.</a:t>
+            </a:r>
+          </a:p>
+        </p:txBody>
+      </p:sp>
+      <p:sp>
+        <p:nvSpPr>
+          <p:cNvPr id="31" name="Right Brace 30">
+            <a:extLst>
+              <a:ext uri="{FF2B5EF4-FFF2-40B4-BE49-F238E27FC236}">
+                <a16:creationId xmlns:a16="http://schemas.microsoft.com/office/drawing/2014/main" id="{D0C256D1-1B95-7B45-8FC8-8F5D07C355AA}"/>
+              </a:ext>
+            </a:extLst>
+          </p:cNvPr>
+          <p:cNvSpPr/>
+          <p:nvPr/>
+        </p:nvSpPr>
+        <p:spPr>
+          <a:xfrm flipH="1">
+            <a:off x="1614408" y="2158730"/>
+            <a:ext cx="181059" cy="703871"/>
+          </a:xfrm>
+          <a:prstGeom prst="rightBrace">
+            <a:avLst/>
+          </a:prstGeom>
+        </p:spPr>
+        <p:style>
+          <a:lnRef idx="1">
+            <a:schemeClr val="accent1"/>
+          </a:lnRef>
+          <a:fillRef idx="0">
+            <a:schemeClr val="accent1"/>
+          </a:fillRef>
+          <a:effectRef idx="0">
+            <a:schemeClr val="accent1"/>
+          </a:effectRef>
+          <a:fontRef idx="minor">
+            <a:schemeClr val="tx1"/>
+          </a:fontRef>
+        </p:style>
+        <p:txBody>
+          <a:bodyPr rtlCol="0" anchor="ctr"/>
+          <a:lstStyle/>
+          <a:p>
+            <a:pPr algn="ctr"/>
+            <a:endParaRPr lang="en-US" b="1"/>
+          </a:p>
+        </p:txBody>
+      </p:sp>
+      <p:sp>
+        <p:nvSpPr>
+          <p:cNvPr id="33" name="TextBox 32">
+            <a:extLst>
+              <a:ext uri="{FF2B5EF4-FFF2-40B4-BE49-F238E27FC236}">
+                <a16:creationId xmlns:a16="http://schemas.microsoft.com/office/drawing/2014/main" id="{6F74EB7A-5009-B14D-868A-89C38020DC25}"/>
+              </a:ext>
+            </a:extLst>
+          </p:cNvPr>
+          <p:cNvSpPr txBox="1"/>
+          <p:nvPr/>
+        </p:nvSpPr>
+        <p:spPr>
+          <a:xfrm>
+            <a:off x="884352" y="2329657"/>
+            <a:ext cx="763351" cy="369332"/>
+          </a:xfrm>
+          <a:prstGeom prst="rect">
+            <a:avLst/>
+          </a:prstGeom>
+          <a:noFill/>
+        </p:spPr>
+        <p:txBody>
+          <a:bodyPr wrap="none" rtlCol="0">
+            <a:spAutoFit/>
+          </a:bodyPr>
+          <a:lstStyle/>
+          <a:p>
+            <a:r>
+              <a:rPr lang="en-US" b="1" dirty="0"/>
+              <a:t>Public</a:t>
+            </a:r>
+          </a:p>
+        </p:txBody>
+      </p:sp>
+      <p:sp>
+        <p:nvSpPr>
+          <p:cNvPr id="34" name="Right Brace 33">
+            <a:extLst>
+              <a:ext uri="{FF2B5EF4-FFF2-40B4-BE49-F238E27FC236}">
+                <a16:creationId xmlns:a16="http://schemas.microsoft.com/office/drawing/2014/main" id="{1F8659BB-F495-9E4C-BA2C-1D261354C048}"/>
+              </a:ext>
+            </a:extLst>
+          </p:cNvPr>
+          <p:cNvSpPr/>
+          <p:nvPr/>
+        </p:nvSpPr>
+        <p:spPr>
+          <a:xfrm flipH="1">
+            <a:off x="1762172" y="4677508"/>
+            <a:ext cx="246888" cy="456533"/>
+          </a:xfrm>
+          <a:prstGeom prst="rightBrace">
+            <a:avLst/>
+          </a:prstGeom>
+        </p:spPr>
+        <p:style>
+          <a:lnRef idx="1">
+            <a:schemeClr val="accent1"/>
+          </a:lnRef>
+          <a:fillRef idx="0">
+            <a:schemeClr val="accent1"/>
+          </a:fillRef>
+          <a:effectRef idx="0">
+            <a:schemeClr val="accent1"/>
+          </a:effectRef>
+          <a:fontRef idx="minor">
+            <a:schemeClr val="tx1"/>
+          </a:fontRef>
+        </p:style>
+        <p:txBody>
+          <a:bodyPr rtlCol="0" anchor="ctr"/>
+          <a:lstStyle/>
+          <a:p>
+            <a:pPr algn="ctr"/>
+            <a:endParaRPr lang="en-US" b="1"/>
+          </a:p>
+        </p:txBody>
+      </p:sp>
+      <p:sp>
+        <p:nvSpPr>
+          <p:cNvPr id="35" name="TextBox 34">
+            <a:extLst>
+              <a:ext uri="{FF2B5EF4-FFF2-40B4-BE49-F238E27FC236}">
+                <a16:creationId xmlns:a16="http://schemas.microsoft.com/office/drawing/2014/main" id="{8989CB6E-97DE-6345-9543-0E726BE023DF}"/>
+              </a:ext>
+            </a:extLst>
+          </p:cNvPr>
+          <p:cNvSpPr txBox="1"/>
+          <p:nvPr/>
+        </p:nvSpPr>
+        <p:spPr>
+          <a:xfrm>
+            <a:off x="998821" y="4721108"/>
+            <a:ext cx="763351" cy="369332"/>
+          </a:xfrm>
+          <a:prstGeom prst="rect">
+            <a:avLst/>
+          </a:prstGeom>
+          <a:noFill/>
+        </p:spPr>
+        <p:txBody>
+          <a:bodyPr wrap="none" rtlCol="0">
+            <a:spAutoFit/>
+          </a:bodyPr>
+          <a:lstStyle/>
+          <a:p>
+            <a:r>
+              <a:rPr lang="en-US" b="1" dirty="0"/>
+              <a:t>Public</a:t>
+            </a:r>
           </a:p>
         </p:txBody>
       </p:sp>

</xml_diff>

<commit_message>
filled explanations without code snippets for slide 04
</commit_message>
<xml_diff>
--- a/images.pptx
+++ b/images.pptx
@@ -5,7 +5,7 @@
     <p:sldMasterId id="2147483648" r:id="rId1"/>
   </p:sldMasterIdLst>
   <p:notesMasterIdLst>
-    <p:notesMasterId r:id="rId47"/>
+    <p:notesMasterId r:id="rId50"/>
   </p:notesMasterIdLst>
   <p:sldIdLst>
     <p:sldId id="257" r:id="rId2"/>
@@ -53,6 +53,9 @@
     <p:sldId id="297" r:id="rId44"/>
     <p:sldId id="300" r:id="rId45"/>
     <p:sldId id="298" r:id="rId46"/>
+    <p:sldId id="301" r:id="rId47"/>
+    <p:sldId id="302" r:id="rId48"/>
+    <p:sldId id="303" r:id="rId49"/>
   </p:sldIdLst>
   <p:sldSz cx="12192000" cy="6858000"/>
   <p:notesSz cx="6858000" cy="9144000"/>
@@ -241,7 +244,7 @@
           <a:p>
             <a:fld id="{7CEEDDC0-DF20-AC46-B752-4D05A37D4059}" type="datetimeFigureOut">
               <a:rPr lang="en-US" smtClean="0"/>
-              <a:t>10/16/19</a:t>
+              <a:t>10/20/19</a:t>
             </a:fld>
             <a:endParaRPr lang="en-US"/>
           </a:p>
@@ -1243,7 +1246,7 @@
           <a:p>
             <a:fld id="{ABB50B84-C221-BA49-B172-B6D4747B1BA4}" type="datetimeFigureOut">
               <a:rPr lang="en-US" smtClean="0"/>
-              <a:t>10/16/19</a:t>
+              <a:t>10/20/19</a:t>
             </a:fld>
             <a:endParaRPr lang="en-US"/>
           </a:p>
@@ -1441,7 +1444,7 @@
           <a:p>
             <a:fld id="{ABB50B84-C221-BA49-B172-B6D4747B1BA4}" type="datetimeFigureOut">
               <a:rPr lang="en-US" smtClean="0"/>
-              <a:t>10/16/19</a:t>
+              <a:t>10/20/19</a:t>
             </a:fld>
             <a:endParaRPr lang="en-US"/>
           </a:p>
@@ -1649,7 +1652,7 @@
           <a:p>
             <a:fld id="{ABB50B84-C221-BA49-B172-B6D4747B1BA4}" type="datetimeFigureOut">
               <a:rPr lang="en-US" smtClean="0"/>
-              <a:t>10/16/19</a:t>
+              <a:t>10/20/19</a:t>
             </a:fld>
             <a:endParaRPr lang="en-US"/>
           </a:p>
@@ -1847,7 +1850,7 @@
           <a:p>
             <a:fld id="{ABB50B84-C221-BA49-B172-B6D4747B1BA4}" type="datetimeFigureOut">
               <a:rPr lang="en-US" smtClean="0"/>
-              <a:t>10/16/19</a:t>
+              <a:t>10/20/19</a:t>
             </a:fld>
             <a:endParaRPr lang="en-US"/>
           </a:p>
@@ -2122,7 +2125,7 @@
           <a:p>
             <a:fld id="{ABB50B84-C221-BA49-B172-B6D4747B1BA4}" type="datetimeFigureOut">
               <a:rPr lang="en-US" smtClean="0"/>
-              <a:t>10/16/19</a:t>
+              <a:t>10/20/19</a:t>
             </a:fld>
             <a:endParaRPr lang="en-US"/>
           </a:p>
@@ -2387,7 +2390,7 @@
           <a:p>
             <a:fld id="{ABB50B84-C221-BA49-B172-B6D4747B1BA4}" type="datetimeFigureOut">
               <a:rPr lang="en-US" smtClean="0"/>
-              <a:t>10/16/19</a:t>
+              <a:t>10/20/19</a:t>
             </a:fld>
             <a:endParaRPr lang="en-US"/>
           </a:p>
@@ -2799,7 +2802,7 @@
           <a:p>
             <a:fld id="{ABB50B84-C221-BA49-B172-B6D4747B1BA4}" type="datetimeFigureOut">
               <a:rPr lang="en-US" smtClean="0"/>
-              <a:t>10/16/19</a:t>
+              <a:t>10/20/19</a:t>
             </a:fld>
             <a:endParaRPr lang="en-US"/>
           </a:p>
@@ -2940,7 +2943,7 @@
           <a:p>
             <a:fld id="{ABB50B84-C221-BA49-B172-B6D4747B1BA4}" type="datetimeFigureOut">
               <a:rPr lang="en-US" smtClean="0"/>
-              <a:t>10/16/19</a:t>
+              <a:t>10/20/19</a:t>
             </a:fld>
             <a:endParaRPr lang="en-US"/>
           </a:p>
@@ -3053,7 +3056,7 @@
           <a:p>
             <a:fld id="{ABB50B84-C221-BA49-B172-B6D4747B1BA4}" type="datetimeFigureOut">
               <a:rPr lang="en-US" smtClean="0"/>
-              <a:t>10/16/19</a:t>
+              <a:t>10/20/19</a:t>
             </a:fld>
             <a:endParaRPr lang="en-US"/>
           </a:p>
@@ -3364,7 +3367,7 @@
           <a:p>
             <a:fld id="{ABB50B84-C221-BA49-B172-B6D4747B1BA4}" type="datetimeFigureOut">
               <a:rPr lang="en-US" smtClean="0"/>
-              <a:t>10/16/19</a:t>
+              <a:t>10/20/19</a:t>
             </a:fld>
             <a:endParaRPr lang="en-US"/>
           </a:p>
@@ -3652,7 +3655,7 @@
           <a:p>
             <a:fld id="{ABB50B84-C221-BA49-B172-B6D4747B1BA4}" type="datetimeFigureOut">
               <a:rPr lang="en-US" smtClean="0"/>
-              <a:t>10/16/19</a:t>
+              <a:t>10/20/19</a:t>
             </a:fld>
             <a:endParaRPr lang="en-US"/>
           </a:p>
@@ -3893,7 +3896,7 @@
           <a:p>
             <a:fld id="{ABB50B84-C221-BA49-B172-B6D4747B1BA4}" type="datetimeFigureOut">
               <a:rPr lang="en-US" smtClean="0"/>
-              <a:t>10/16/19</a:t>
+              <a:t>10/20/19</a:t>
             </a:fld>
             <a:endParaRPr lang="en-US"/>
           </a:p>
@@ -44101,6 +44104,3890 @@
     <p:extLst>
       <p:ext uri="{BB962C8B-B14F-4D97-AF65-F5344CB8AC3E}">
         <p14:creationId xmlns:p14="http://schemas.microsoft.com/office/powerpoint/2010/main" val="3749426606"/>
+      </p:ext>
+    </p:extLst>
+  </p:cSld>
+  <p:clrMapOvr>
+    <a:masterClrMapping/>
+  </p:clrMapOvr>
+</p:sld>
+</file>
+
+<file path=ppt/slides/slide46.xml><?xml version="1.0" encoding="utf-8"?>
+<p:sld xmlns:a="http://schemas.openxmlformats.org/drawingml/2006/main" xmlns:r="http://schemas.openxmlformats.org/officeDocument/2006/relationships" xmlns:p="http://schemas.openxmlformats.org/presentationml/2006/main">
+  <p:cSld>
+    <p:spTree>
+      <p:nvGrpSpPr>
+        <p:cNvPr id="1" name=""/>
+        <p:cNvGrpSpPr/>
+        <p:nvPr/>
+      </p:nvGrpSpPr>
+      <p:grpSpPr>
+        <a:xfrm>
+          <a:off x="0" y="0"/>
+          <a:ext cx="0" cy="0"/>
+          <a:chOff x="0" y="0"/>
+          <a:chExt cx="0" cy="0"/>
+        </a:xfrm>
+      </p:grpSpPr>
+      <p:sp>
+        <p:nvSpPr>
+          <p:cNvPr id="14" name="四角形: 角を丸くする 3">
+            <a:extLst>
+              <a:ext uri="{FF2B5EF4-FFF2-40B4-BE49-F238E27FC236}">
+                <a16:creationId xmlns:a16="http://schemas.microsoft.com/office/drawing/2014/main" id="{A3BE7524-7058-6E43-98FB-35E13C767133}"/>
+              </a:ext>
+            </a:extLst>
+          </p:cNvPr>
+          <p:cNvSpPr/>
+          <p:nvPr/>
+        </p:nvSpPr>
+        <p:spPr>
+          <a:xfrm>
+            <a:off x="5518415" y="1604750"/>
+            <a:ext cx="1155170" cy="636104"/>
+          </a:xfrm>
+          <a:prstGeom prst="roundRect">
+            <a:avLst/>
+          </a:prstGeom>
+          <a:solidFill>
+            <a:schemeClr val="accent4">
+              <a:lumMod val="20000"/>
+              <a:lumOff val="80000"/>
+            </a:schemeClr>
+          </a:solidFill>
+          <a:ln w="38100"/>
+        </p:spPr>
+        <p:style>
+          <a:lnRef idx="2">
+            <a:schemeClr val="accent1"/>
+          </a:lnRef>
+          <a:fillRef idx="1">
+            <a:schemeClr val="lt1"/>
+          </a:fillRef>
+          <a:effectRef idx="0">
+            <a:schemeClr val="accent1"/>
+          </a:effectRef>
+          <a:fontRef idx="minor">
+            <a:schemeClr val="dk1"/>
+          </a:fontRef>
+        </p:style>
+        <p:txBody>
+          <a:bodyPr rtlCol="0" anchor="ctr"/>
+          <a:lstStyle/>
+          <a:p>
+            <a:pPr algn="ctr"/>
+            <a:r>
+              <a:rPr kumimoji="1" lang="en-US" altLang="ja-JP" sz="1600" b="1" dirty="0"/>
+              <a:t>RSA Naïve Signing</a:t>
+            </a:r>
+          </a:p>
+        </p:txBody>
+      </p:sp>
+      <p:cxnSp>
+        <p:nvCxnSpPr>
+          <p:cNvPr id="15" name="直線矢印コネクタ 6">
+            <a:extLst>
+              <a:ext uri="{FF2B5EF4-FFF2-40B4-BE49-F238E27FC236}">
+                <a16:creationId xmlns:a16="http://schemas.microsoft.com/office/drawing/2014/main" id="{E9930A9C-F763-FB4D-81D1-66D462B60FE5}"/>
+              </a:ext>
+            </a:extLst>
+          </p:cNvPr>
+          <p:cNvCxnSpPr>
+            <a:cxnSpLocks/>
+            <a:endCxn id="14" idx="0"/>
+          </p:cNvCxnSpPr>
+          <p:nvPr/>
+        </p:nvCxnSpPr>
+        <p:spPr>
+          <a:xfrm>
+            <a:off x="6096000" y="922309"/>
+            <a:ext cx="0" cy="682441"/>
+          </a:xfrm>
+          <a:prstGeom prst="straightConnector1">
+            <a:avLst/>
+          </a:prstGeom>
+          <a:ln w="38100">
+            <a:solidFill>
+              <a:schemeClr val="tx1"/>
+            </a:solidFill>
+            <a:tailEnd type="triangle"/>
+          </a:ln>
+        </p:spPr>
+        <p:style>
+          <a:lnRef idx="1">
+            <a:schemeClr val="accent1"/>
+          </a:lnRef>
+          <a:fillRef idx="0">
+            <a:schemeClr val="accent1"/>
+          </a:fillRef>
+          <a:effectRef idx="0">
+            <a:schemeClr val="accent1"/>
+          </a:effectRef>
+          <a:fontRef idx="minor">
+            <a:schemeClr val="tx1"/>
+          </a:fontRef>
+        </p:style>
+      </p:cxnSp>
+      <p:cxnSp>
+        <p:nvCxnSpPr>
+          <p:cNvPr id="16" name="直線矢印コネクタ 7">
+            <a:extLst>
+              <a:ext uri="{FF2B5EF4-FFF2-40B4-BE49-F238E27FC236}">
+                <a16:creationId xmlns:a16="http://schemas.microsoft.com/office/drawing/2014/main" id="{A1BB8BE1-FBFC-6843-BEE8-E9512EEC6BD4}"/>
+              </a:ext>
+            </a:extLst>
+          </p:cNvPr>
+          <p:cNvCxnSpPr>
+            <a:cxnSpLocks/>
+            <a:stCxn id="14" idx="3"/>
+          </p:cNvCxnSpPr>
+          <p:nvPr/>
+        </p:nvCxnSpPr>
+        <p:spPr>
+          <a:xfrm>
+            <a:off x="6673585" y="1922802"/>
+            <a:ext cx="558963" cy="0"/>
+          </a:xfrm>
+          <a:prstGeom prst="straightConnector1">
+            <a:avLst/>
+          </a:prstGeom>
+          <a:ln w="38100">
+            <a:solidFill>
+              <a:schemeClr val="tx1"/>
+            </a:solidFill>
+            <a:tailEnd type="triangle"/>
+          </a:ln>
+        </p:spPr>
+        <p:style>
+          <a:lnRef idx="1">
+            <a:schemeClr val="accent1"/>
+          </a:lnRef>
+          <a:fillRef idx="0">
+            <a:schemeClr val="accent1"/>
+          </a:fillRef>
+          <a:effectRef idx="0">
+            <a:schemeClr val="accent1"/>
+          </a:effectRef>
+          <a:fontRef idx="minor">
+            <a:schemeClr val="tx1"/>
+          </a:fontRef>
+        </p:style>
+      </p:cxnSp>
+      <p:pic>
+        <p:nvPicPr>
+          <p:cNvPr id="18" name="Picture 14">
+            <a:extLst>
+              <a:ext uri="{FF2B5EF4-FFF2-40B4-BE49-F238E27FC236}">
+                <a16:creationId xmlns:a16="http://schemas.microsoft.com/office/drawing/2014/main" id="{8AE18525-62CC-764E-85F8-0D09E6D0994F}"/>
+              </a:ext>
+            </a:extLst>
+          </p:cNvPr>
+          <p:cNvPicPr>
+            <a:picLocks noChangeAspect="1"/>
+          </p:cNvPicPr>
+          <p:nvPr/>
+        </p:nvPicPr>
+        <p:blipFill>
+          <a:blip r:embed="rId2"/>
+          <a:stretch>
+            <a:fillRect/>
+          </a:stretch>
+        </p:blipFill>
+        <p:spPr>
+          <a:xfrm rot="2482566">
+            <a:off x="6327003" y="958371"/>
+            <a:ext cx="163450" cy="517592"/>
+          </a:xfrm>
+          <a:prstGeom prst="rect">
+            <a:avLst/>
+          </a:prstGeom>
+        </p:spPr>
+      </p:pic>
+      <p:sp>
+        <p:nvSpPr>
+          <p:cNvPr id="21" name="TextBox 45">
+            <a:extLst>
+              <a:ext uri="{FF2B5EF4-FFF2-40B4-BE49-F238E27FC236}">
+                <a16:creationId xmlns:a16="http://schemas.microsoft.com/office/drawing/2014/main" id="{7B18DA88-3840-AE44-94E8-351D89ABA3BB}"/>
+              </a:ext>
+            </a:extLst>
+          </p:cNvPr>
+          <p:cNvSpPr txBox="1"/>
+          <p:nvPr/>
+        </p:nvSpPr>
+        <p:spPr>
+          <a:xfrm>
+            <a:off x="4821124" y="830151"/>
+            <a:ext cx="1394582" cy="646331"/>
+          </a:xfrm>
+          <a:prstGeom prst="rect">
+            <a:avLst/>
+          </a:prstGeom>
+          <a:noFill/>
+        </p:spPr>
+        <p:txBody>
+          <a:bodyPr wrap="square" rtlCol="0">
+            <a:spAutoFit/>
+          </a:bodyPr>
+          <a:lstStyle/>
+          <a:p>
+            <a:r>
+              <a:rPr lang="en-US" b="1" dirty="0"/>
+              <a:t>Sender’s</a:t>
+            </a:r>
+          </a:p>
+          <a:p>
+            <a:r>
+              <a:rPr lang="en-US" b="1" dirty="0"/>
+              <a:t>Private Key</a:t>
+            </a:r>
+          </a:p>
+        </p:txBody>
+      </p:sp>
+      <p:cxnSp>
+        <p:nvCxnSpPr>
+          <p:cNvPr id="22" name="直線矢印コネクタ 19">
+            <a:extLst>
+              <a:ext uri="{FF2B5EF4-FFF2-40B4-BE49-F238E27FC236}">
+                <a16:creationId xmlns:a16="http://schemas.microsoft.com/office/drawing/2014/main" id="{8384FB24-220A-5C4A-9799-3C1F6D0AA327}"/>
+              </a:ext>
+            </a:extLst>
+          </p:cNvPr>
+          <p:cNvCxnSpPr>
+            <a:cxnSpLocks/>
+            <a:endCxn id="14" idx="1"/>
+          </p:cNvCxnSpPr>
+          <p:nvPr/>
+        </p:nvCxnSpPr>
+        <p:spPr>
+          <a:xfrm>
+            <a:off x="5044861" y="1922802"/>
+            <a:ext cx="473554" cy="0"/>
+          </a:xfrm>
+          <a:prstGeom prst="straightConnector1">
+            <a:avLst/>
+          </a:prstGeom>
+          <a:ln w="38100">
+            <a:solidFill>
+              <a:schemeClr val="tx1"/>
+            </a:solidFill>
+            <a:tailEnd type="triangle"/>
+          </a:ln>
+        </p:spPr>
+        <p:style>
+          <a:lnRef idx="1">
+            <a:schemeClr val="accent1"/>
+          </a:lnRef>
+          <a:fillRef idx="0">
+            <a:schemeClr val="accent1"/>
+          </a:fillRef>
+          <a:effectRef idx="0">
+            <a:schemeClr val="accent1"/>
+          </a:effectRef>
+          <a:fontRef idx="minor">
+            <a:schemeClr val="tx1"/>
+          </a:fontRef>
+        </p:style>
+      </p:cxnSp>
+      <p:pic>
+        <p:nvPicPr>
+          <p:cNvPr id="25" name="Picture 33">
+            <a:extLst>
+              <a:ext uri="{FF2B5EF4-FFF2-40B4-BE49-F238E27FC236}">
+                <a16:creationId xmlns:a16="http://schemas.microsoft.com/office/drawing/2014/main" id="{B37407BB-0C97-6748-9316-6AC4BD6D3826}"/>
+              </a:ext>
+            </a:extLst>
+          </p:cNvPr>
+          <p:cNvPicPr>
+            <a:picLocks noChangeAspect="1"/>
+          </p:cNvPicPr>
+          <p:nvPr/>
+        </p:nvPicPr>
+        <p:blipFill>
+          <a:blip r:embed="rId3"/>
+          <a:stretch>
+            <a:fillRect/>
+          </a:stretch>
+        </p:blipFill>
+        <p:spPr>
+          <a:xfrm>
+            <a:off x="2769064" y="1604750"/>
+            <a:ext cx="620968" cy="620968"/>
+          </a:xfrm>
+          <a:prstGeom prst="rect">
+            <a:avLst/>
+          </a:prstGeom>
+        </p:spPr>
+      </p:pic>
+      <p:pic>
+        <p:nvPicPr>
+          <p:cNvPr id="26" name="Picture 60">
+            <a:extLst>
+              <a:ext uri="{FF2B5EF4-FFF2-40B4-BE49-F238E27FC236}">
+                <a16:creationId xmlns:a16="http://schemas.microsoft.com/office/drawing/2014/main" id="{209B1155-54AB-1648-B415-47DC5F98414D}"/>
+              </a:ext>
+            </a:extLst>
+          </p:cNvPr>
+          <p:cNvPicPr>
+            <a:picLocks noChangeAspect="1"/>
+          </p:cNvPicPr>
+          <p:nvPr/>
+        </p:nvPicPr>
+        <p:blipFill>
+          <a:blip r:embed="rId4"/>
+          <a:stretch>
+            <a:fillRect/>
+          </a:stretch>
+        </p:blipFill>
+        <p:spPr>
+          <a:xfrm>
+            <a:off x="7230402" y="1646269"/>
+            <a:ext cx="598353" cy="636105"/>
+          </a:xfrm>
+          <a:prstGeom prst="rect">
+            <a:avLst/>
+          </a:prstGeom>
+        </p:spPr>
+      </p:pic>
+      <p:sp>
+        <p:nvSpPr>
+          <p:cNvPr id="27" name="TextBox 45">
+            <a:extLst>
+              <a:ext uri="{FF2B5EF4-FFF2-40B4-BE49-F238E27FC236}">
+                <a16:creationId xmlns:a16="http://schemas.microsoft.com/office/drawing/2014/main" id="{1D28C33F-5C20-054C-82C5-F00A53E1F723}"/>
+              </a:ext>
+            </a:extLst>
+          </p:cNvPr>
+          <p:cNvSpPr txBox="1"/>
+          <p:nvPr/>
+        </p:nvSpPr>
+        <p:spPr>
+          <a:xfrm>
+            <a:off x="2601221" y="2183884"/>
+            <a:ext cx="956654" cy="646331"/>
+          </a:xfrm>
+          <a:prstGeom prst="rect">
+            <a:avLst/>
+          </a:prstGeom>
+          <a:noFill/>
+        </p:spPr>
+        <p:txBody>
+          <a:bodyPr wrap="square" rtlCol="0">
+            <a:spAutoFit/>
+          </a:bodyPr>
+          <a:lstStyle/>
+          <a:p>
+            <a:pPr algn="ctr"/>
+            <a:r>
+              <a:rPr lang="en-US" b="1" dirty="0"/>
+              <a:t>Hashed Data </a:t>
+            </a:r>
+            <a:r>
+              <a:rPr lang="en-US" b="1" i="1" dirty="0"/>
+              <a:t>h</a:t>
+            </a:r>
+          </a:p>
+        </p:txBody>
+      </p:sp>
+      <p:sp>
+        <p:nvSpPr>
+          <p:cNvPr id="28" name="TextBox 45">
+            <a:extLst>
+              <a:ext uri="{FF2B5EF4-FFF2-40B4-BE49-F238E27FC236}">
+                <a16:creationId xmlns:a16="http://schemas.microsoft.com/office/drawing/2014/main" id="{7C26FCDA-56BB-C64D-A0D3-4AEE77FB8EC7}"/>
+              </a:ext>
+            </a:extLst>
+          </p:cNvPr>
+          <p:cNvSpPr txBox="1"/>
+          <p:nvPr/>
+        </p:nvSpPr>
+        <p:spPr>
+          <a:xfrm>
+            <a:off x="6673585" y="2233286"/>
+            <a:ext cx="1466978" cy="369332"/>
+          </a:xfrm>
+          <a:prstGeom prst="rect">
+            <a:avLst/>
+          </a:prstGeom>
+          <a:noFill/>
+        </p:spPr>
+        <p:txBody>
+          <a:bodyPr wrap="square" rtlCol="0">
+            <a:spAutoFit/>
+          </a:bodyPr>
+          <a:lstStyle/>
+          <a:p>
+            <a:pPr algn="ctr"/>
+            <a:r>
+              <a:rPr lang="en-US" b="1" dirty="0"/>
+              <a:t>Signature</a:t>
+            </a:r>
+            <a:r>
+              <a:rPr lang="ja-JP" altLang="en-US" b="1"/>
+              <a:t> </a:t>
+            </a:r>
+            <a:r>
+              <a:rPr lang="en-US" altLang="ja-JP" b="1" i="1" dirty="0"/>
+              <a:t>s</a:t>
+            </a:r>
+            <a:endParaRPr lang="en-US" b="1" i="1" dirty="0"/>
+          </a:p>
+        </p:txBody>
+      </p:sp>
+      <p:sp>
+        <p:nvSpPr>
+          <p:cNvPr id="38" name="四角形: 角を丸くする 3">
+            <a:extLst>
+              <a:ext uri="{FF2B5EF4-FFF2-40B4-BE49-F238E27FC236}">
+                <a16:creationId xmlns:a16="http://schemas.microsoft.com/office/drawing/2014/main" id="{9EA2EF5F-1B1E-0C4E-A7B9-BAA4EA135202}"/>
+              </a:ext>
+            </a:extLst>
+          </p:cNvPr>
+          <p:cNvSpPr/>
+          <p:nvPr/>
+        </p:nvSpPr>
+        <p:spPr>
+          <a:xfrm>
+            <a:off x="3882827" y="1602180"/>
+            <a:ext cx="1155170" cy="636104"/>
+          </a:xfrm>
+          <a:prstGeom prst="roundRect">
+            <a:avLst/>
+          </a:prstGeom>
+          <a:solidFill>
+            <a:schemeClr val="accent6">
+              <a:lumMod val="20000"/>
+              <a:lumOff val="80000"/>
+            </a:schemeClr>
+          </a:solidFill>
+          <a:ln w="38100"/>
+        </p:spPr>
+        <p:style>
+          <a:lnRef idx="2">
+            <a:schemeClr val="accent1"/>
+          </a:lnRef>
+          <a:fillRef idx="1">
+            <a:schemeClr val="lt1"/>
+          </a:fillRef>
+          <a:effectRef idx="0">
+            <a:schemeClr val="accent1"/>
+          </a:effectRef>
+          <a:fontRef idx="minor">
+            <a:schemeClr val="dk1"/>
+          </a:fontRef>
+        </p:style>
+        <p:txBody>
+          <a:bodyPr rtlCol="0" anchor="ctr"/>
+          <a:lstStyle/>
+          <a:p>
+            <a:pPr algn="ctr"/>
+            <a:r>
+              <a:rPr kumimoji="1" lang="en-US" altLang="ja-JP" b="1" dirty="0"/>
+              <a:t>Padding</a:t>
+            </a:r>
+          </a:p>
+        </p:txBody>
+      </p:sp>
+      <p:cxnSp>
+        <p:nvCxnSpPr>
+          <p:cNvPr id="39" name="直線矢印コネクタ 19">
+            <a:extLst>
+              <a:ext uri="{FF2B5EF4-FFF2-40B4-BE49-F238E27FC236}">
+                <a16:creationId xmlns:a16="http://schemas.microsoft.com/office/drawing/2014/main" id="{BF6A660A-15A1-9B40-8069-B7460ABD1E52}"/>
+              </a:ext>
+            </a:extLst>
+          </p:cNvPr>
+          <p:cNvCxnSpPr>
+            <a:cxnSpLocks/>
+          </p:cNvCxnSpPr>
+          <p:nvPr/>
+        </p:nvCxnSpPr>
+        <p:spPr>
+          <a:xfrm>
+            <a:off x="3409273" y="1900772"/>
+            <a:ext cx="473554" cy="0"/>
+          </a:xfrm>
+          <a:prstGeom prst="straightConnector1">
+            <a:avLst/>
+          </a:prstGeom>
+          <a:ln w="38100">
+            <a:solidFill>
+              <a:schemeClr val="tx1"/>
+            </a:solidFill>
+            <a:tailEnd type="triangle"/>
+          </a:ln>
+        </p:spPr>
+        <p:style>
+          <a:lnRef idx="1">
+            <a:schemeClr val="accent1"/>
+          </a:lnRef>
+          <a:fillRef idx="0">
+            <a:schemeClr val="accent1"/>
+          </a:fillRef>
+          <a:effectRef idx="0">
+            <a:schemeClr val="accent1"/>
+          </a:effectRef>
+          <a:fontRef idx="minor">
+            <a:schemeClr val="tx1"/>
+          </a:fontRef>
+        </p:style>
+      </p:cxnSp>
+      <p:sp>
+        <p:nvSpPr>
+          <p:cNvPr id="41" name="TextBox 45">
+            <a:extLst>
+              <a:ext uri="{FF2B5EF4-FFF2-40B4-BE49-F238E27FC236}">
+                <a16:creationId xmlns:a16="http://schemas.microsoft.com/office/drawing/2014/main" id="{7236847A-B49F-DB41-833A-423F69C11C5D}"/>
+              </a:ext>
+            </a:extLst>
+          </p:cNvPr>
+          <p:cNvSpPr txBox="1"/>
+          <p:nvPr/>
+        </p:nvSpPr>
+        <p:spPr>
+          <a:xfrm>
+            <a:off x="4754097" y="2219091"/>
+            <a:ext cx="1005173" cy="646331"/>
+          </a:xfrm>
+          <a:prstGeom prst="rect">
+            <a:avLst/>
+          </a:prstGeom>
+          <a:noFill/>
+        </p:spPr>
+        <p:txBody>
+          <a:bodyPr wrap="square" rtlCol="0">
+            <a:spAutoFit/>
+          </a:bodyPr>
+          <a:lstStyle/>
+          <a:p>
+            <a:pPr algn="ctr"/>
+            <a:r>
+              <a:rPr lang="en-US" b="1" dirty="0"/>
+              <a:t>Padded data</a:t>
+            </a:r>
+            <a:r>
+              <a:rPr lang="ja-JP" altLang="en-US" b="1"/>
+              <a:t> </a:t>
+            </a:r>
+            <a:r>
+              <a:rPr lang="en-US" altLang="ja-JP" b="1" i="1" dirty="0"/>
+              <a:t>m</a:t>
+            </a:r>
+            <a:endParaRPr lang="en-US" b="1" i="1" dirty="0"/>
+          </a:p>
+        </p:txBody>
+      </p:sp>
+      <p:sp>
+        <p:nvSpPr>
+          <p:cNvPr id="52" name="Line Callout 2 (Accent Bar) 51">
+            <a:extLst>
+              <a:ext uri="{FF2B5EF4-FFF2-40B4-BE49-F238E27FC236}">
+                <a16:creationId xmlns:a16="http://schemas.microsoft.com/office/drawing/2014/main" id="{07041962-5E07-9D40-A53B-A29BC6612F14}"/>
+              </a:ext>
+            </a:extLst>
+          </p:cNvPr>
+          <p:cNvSpPr/>
+          <p:nvPr/>
+        </p:nvSpPr>
+        <p:spPr>
+          <a:xfrm>
+            <a:off x="4869813" y="3175905"/>
+            <a:ext cx="2983928" cy="369332"/>
+          </a:xfrm>
+          <a:prstGeom prst="accentCallout2">
+            <a:avLst>
+              <a:gd name="adj1" fmla="val 17034"/>
+              <a:gd name="adj2" fmla="val -2990"/>
+              <a:gd name="adj3" fmla="val 17034"/>
+              <a:gd name="adj4" fmla="val -10679"/>
+              <a:gd name="adj5" fmla="val -276082"/>
+              <a:gd name="adj6" fmla="val -26261"/>
+            </a:avLst>
+          </a:prstGeom>
+          <a:noFill/>
+        </p:spPr>
+        <p:style>
+          <a:lnRef idx="2">
+            <a:schemeClr val="accent1">
+              <a:shade val="50000"/>
+            </a:schemeClr>
+          </a:lnRef>
+          <a:fillRef idx="1">
+            <a:schemeClr val="accent1"/>
+          </a:fillRef>
+          <a:effectRef idx="0">
+            <a:schemeClr val="accent1"/>
+          </a:effectRef>
+          <a:fontRef idx="minor">
+            <a:schemeClr val="lt1"/>
+          </a:fontRef>
+        </p:style>
+        <p:txBody>
+          <a:bodyPr rtlCol="0" anchor="ctr"/>
+          <a:lstStyle/>
+          <a:p>
+            <a:r>
+              <a:rPr lang="en-US" b="1" dirty="0">
+                <a:solidFill>
+                  <a:srgbClr val="FF0000"/>
+                </a:solidFill>
+              </a:rPr>
+              <a:t>PKCS#</a:t>
+            </a:r>
+            <a:r>
+              <a:rPr lang="en-US" b="1">
+                <a:solidFill>
+                  <a:srgbClr val="FF0000"/>
+                </a:solidFill>
+              </a:rPr>
+              <a:t>1-v1.5 padding or </a:t>
+            </a:r>
+            <a:r>
+              <a:rPr lang="en-US" b="1" dirty="0">
+                <a:solidFill>
+                  <a:srgbClr val="FF0000"/>
+                </a:solidFill>
+              </a:rPr>
+              <a:t>PSS</a:t>
+            </a:r>
+          </a:p>
+        </p:txBody>
+      </p:sp>
+    </p:spTree>
+    <p:extLst>
+      <p:ext uri="{BB962C8B-B14F-4D97-AF65-F5344CB8AC3E}">
+        <p14:creationId xmlns:p14="http://schemas.microsoft.com/office/powerpoint/2010/main" val="2243848639"/>
+      </p:ext>
+    </p:extLst>
+  </p:cSld>
+  <p:clrMapOvr>
+    <a:masterClrMapping/>
+  </p:clrMapOvr>
+</p:sld>
+</file>
+
+<file path=ppt/slides/slide47.xml><?xml version="1.0" encoding="utf-8"?>
+<p:sld xmlns:a="http://schemas.openxmlformats.org/drawingml/2006/main" xmlns:r="http://schemas.openxmlformats.org/officeDocument/2006/relationships" xmlns:p="http://schemas.openxmlformats.org/presentationml/2006/main">
+  <p:cSld>
+    <p:spTree>
+      <p:nvGrpSpPr>
+        <p:cNvPr id="1" name=""/>
+        <p:cNvGrpSpPr/>
+        <p:nvPr/>
+      </p:nvGrpSpPr>
+      <p:grpSpPr>
+        <a:xfrm>
+          <a:off x="0" y="0"/>
+          <a:ext cx="0" cy="0"/>
+          <a:chOff x="0" y="0"/>
+          <a:chExt cx="0" cy="0"/>
+        </a:xfrm>
+      </p:grpSpPr>
+      <p:sp>
+        <p:nvSpPr>
+          <p:cNvPr id="4" name="正方形/長方形 3">
+            <a:extLst>
+              <a:ext uri="{FF2B5EF4-FFF2-40B4-BE49-F238E27FC236}">
+                <a16:creationId xmlns:a16="http://schemas.microsoft.com/office/drawing/2014/main" id="{DDBEBF20-86A8-4952-8784-7156E98E718B}"/>
+              </a:ext>
+            </a:extLst>
+          </p:cNvPr>
+          <p:cNvSpPr/>
+          <p:nvPr/>
+        </p:nvSpPr>
+        <p:spPr>
+          <a:xfrm>
+            <a:off x="6406475" y="62392"/>
+            <a:ext cx="2252870" cy="437322"/>
+          </a:xfrm>
+          <a:prstGeom prst="rect">
+            <a:avLst/>
+          </a:prstGeom>
+          <a:solidFill>
+            <a:schemeClr val="bg1"/>
+          </a:solidFill>
+          <a:ln w="38100">
+            <a:solidFill>
+              <a:schemeClr val="tx1"/>
+            </a:solidFill>
+          </a:ln>
+        </p:spPr>
+        <p:style>
+          <a:lnRef idx="2">
+            <a:schemeClr val="accent1">
+              <a:shade val="50000"/>
+            </a:schemeClr>
+          </a:lnRef>
+          <a:fillRef idx="1">
+            <a:schemeClr val="accent1"/>
+          </a:fillRef>
+          <a:effectRef idx="0">
+            <a:schemeClr val="accent1"/>
+          </a:effectRef>
+          <a:fontRef idx="minor">
+            <a:schemeClr val="lt1"/>
+          </a:fontRef>
+        </p:style>
+        <p:txBody>
+          <a:bodyPr rtlCol="0" anchor="ctr"/>
+          <a:lstStyle/>
+          <a:p>
+            <a:pPr algn="ctr"/>
+            <a:r>
+              <a:rPr kumimoji="1" lang="en-US" altLang="ja-JP" b="1" dirty="0">
+                <a:solidFill>
+                  <a:schemeClr val="tx1"/>
+                </a:solidFill>
+              </a:rPr>
+              <a:t>Original Data </a:t>
+            </a:r>
+            <a:r>
+              <a:rPr kumimoji="1" lang="en-US" altLang="ja-JP" b="1" i="1" dirty="0">
+                <a:solidFill>
+                  <a:schemeClr val="tx1"/>
+                </a:solidFill>
+              </a:rPr>
+              <a:t>D</a:t>
+            </a:r>
+            <a:endParaRPr kumimoji="1" lang="ja-JP" altLang="en-US" b="1" i="1" dirty="0">
+              <a:solidFill>
+                <a:schemeClr val="tx1"/>
+              </a:solidFill>
+            </a:endParaRPr>
+          </a:p>
+        </p:txBody>
+      </p:sp>
+      <p:sp>
+        <p:nvSpPr>
+          <p:cNvPr id="7" name="正方形/長方形 6">
+            <a:extLst>
+              <a:ext uri="{FF2B5EF4-FFF2-40B4-BE49-F238E27FC236}">
+                <a16:creationId xmlns:a16="http://schemas.microsoft.com/office/drawing/2014/main" id="{44F742F0-0EB0-40F4-89F4-10AA21AA34CB}"/>
+              </a:ext>
+            </a:extLst>
+          </p:cNvPr>
+          <p:cNvSpPr/>
+          <p:nvPr/>
+        </p:nvSpPr>
+        <p:spPr>
+          <a:xfrm>
+            <a:off x="5440799" y="1853009"/>
+            <a:ext cx="1049167" cy="437322"/>
+          </a:xfrm>
+          <a:prstGeom prst="rect">
+            <a:avLst/>
+          </a:prstGeom>
+          <a:solidFill>
+            <a:schemeClr val="bg1"/>
+          </a:solidFill>
+          <a:ln w="38100">
+            <a:solidFill>
+              <a:schemeClr val="tx1"/>
+            </a:solidFill>
+          </a:ln>
+        </p:spPr>
+        <p:style>
+          <a:lnRef idx="2">
+            <a:schemeClr val="accent1">
+              <a:shade val="50000"/>
+            </a:schemeClr>
+          </a:lnRef>
+          <a:fillRef idx="1">
+            <a:schemeClr val="accent1"/>
+          </a:fillRef>
+          <a:effectRef idx="0">
+            <a:schemeClr val="accent1"/>
+          </a:effectRef>
+          <a:fontRef idx="minor">
+            <a:schemeClr val="lt1"/>
+          </a:fontRef>
+        </p:style>
+        <p:txBody>
+          <a:bodyPr rtlCol="0" anchor="ctr"/>
+          <a:lstStyle/>
+          <a:p>
+            <a:pPr algn="ctr"/>
+            <a:r>
+              <a:rPr kumimoji="1" lang="en-US" altLang="ja-JP" b="1" dirty="0">
+                <a:solidFill>
+                  <a:schemeClr val="tx1"/>
+                </a:solidFill>
+              </a:rPr>
+              <a:t>0x00…</a:t>
+            </a:r>
+            <a:endParaRPr kumimoji="1" lang="ja-JP" altLang="en-US" b="1" dirty="0">
+              <a:solidFill>
+                <a:schemeClr val="tx1"/>
+              </a:solidFill>
+            </a:endParaRPr>
+          </a:p>
+        </p:txBody>
+      </p:sp>
+      <p:cxnSp>
+        <p:nvCxnSpPr>
+          <p:cNvPr id="14" name="直線矢印コネクタ 13">
+            <a:extLst>
+              <a:ext uri="{FF2B5EF4-FFF2-40B4-BE49-F238E27FC236}">
+                <a16:creationId xmlns:a16="http://schemas.microsoft.com/office/drawing/2014/main" id="{999F62F4-096E-479F-9E47-CD060C8CBE87}"/>
+              </a:ext>
+            </a:extLst>
+          </p:cNvPr>
+          <p:cNvCxnSpPr>
+            <a:cxnSpLocks/>
+            <a:stCxn id="46" idx="1"/>
+            <a:endCxn id="34" idx="0"/>
+          </p:cNvCxnSpPr>
+          <p:nvPr/>
+        </p:nvCxnSpPr>
+        <p:spPr>
+          <a:xfrm>
+            <a:off x="3280757" y="2701129"/>
+            <a:ext cx="1" cy="834386"/>
+          </a:xfrm>
+          <a:prstGeom prst="straightConnector1">
+            <a:avLst/>
+          </a:prstGeom>
+          <a:ln w="38100">
+            <a:solidFill>
+              <a:schemeClr val="tx1"/>
+            </a:solidFill>
+            <a:tailEnd type="triangle"/>
+          </a:ln>
+        </p:spPr>
+        <p:style>
+          <a:lnRef idx="1">
+            <a:schemeClr val="accent1"/>
+          </a:lnRef>
+          <a:fillRef idx="0">
+            <a:schemeClr val="accent1"/>
+          </a:fillRef>
+          <a:effectRef idx="0">
+            <a:schemeClr val="accent1"/>
+          </a:effectRef>
+          <a:fontRef idx="minor">
+            <a:schemeClr val="tx1"/>
+          </a:fontRef>
+        </p:style>
+      </p:cxnSp>
+      <p:cxnSp>
+        <p:nvCxnSpPr>
+          <p:cNvPr id="17" name="直線矢印コネクタ 16">
+            <a:extLst>
+              <a:ext uri="{FF2B5EF4-FFF2-40B4-BE49-F238E27FC236}">
+                <a16:creationId xmlns:a16="http://schemas.microsoft.com/office/drawing/2014/main" id="{9B33D2AB-6CA7-4267-B74A-21743CB3226D}"/>
+              </a:ext>
+            </a:extLst>
+          </p:cNvPr>
+          <p:cNvCxnSpPr>
+            <a:cxnSpLocks/>
+            <a:stCxn id="35" idx="1"/>
+            <a:endCxn id="40" idx="0"/>
+          </p:cNvCxnSpPr>
+          <p:nvPr/>
+        </p:nvCxnSpPr>
+        <p:spPr>
+          <a:xfrm flipH="1">
+            <a:off x="7636241" y="2701128"/>
+            <a:ext cx="1010" cy="327162"/>
+          </a:xfrm>
+          <a:prstGeom prst="straightConnector1">
+            <a:avLst/>
+          </a:prstGeom>
+          <a:ln w="38100">
+            <a:solidFill>
+              <a:schemeClr val="tx1"/>
+            </a:solidFill>
+            <a:tailEnd type="triangle"/>
+          </a:ln>
+        </p:spPr>
+        <p:style>
+          <a:lnRef idx="1">
+            <a:schemeClr val="accent1"/>
+          </a:lnRef>
+          <a:fillRef idx="0">
+            <a:schemeClr val="accent1"/>
+          </a:fillRef>
+          <a:effectRef idx="0">
+            <a:schemeClr val="accent1"/>
+          </a:effectRef>
+          <a:fontRef idx="minor">
+            <a:schemeClr val="tx1"/>
+          </a:fontRef>
+        </p:style>
+      </p:cxnSp>
+      <p:sp>
+        <p:nvSpPr>
+          <p:cNvPr id="34" name="四角形: 角を丸くする 33">
+            <a:extLst>
+              <a:ext uri="{FF2B5EF4-FFF2-40B4-BE49-F238E27FC236}">
+                <a16:creationId xmlns:a16="http://schemas.microsoft.com/office/drawing/2014/main" id="{D9773A9C-F496-414A-8EB1-DD772C3C3C5D}"/>
+              </a:ext>
+            </a:extLst>
+          </p:cNvPr>
+          <p:cNvSpPr/>
+          <p:nvPr/>
+        </p:nvSpPr>
+        <p:spPr>
+          <a:xfrm>
+            <a:off x="2913011" y="3535515"/>
+            <a:ext cx="735494" cy="636104"/>
+          </a:xfrm>
+          <a:prstGeom prst="roundRect">
+            <a:avLst/>
+          </a:prstGeom>
+          <a:ln w="38100"/>
+        </p:spPr>
+        <p:style>
+          <a:lnRef idx="2">
+            <a:schemeClr val="accent1"/>
+          </a:lnRef>
+          <a:fillRef idx="1">
+            <a:schemeClr val="lt1"/>
+          </a:fillRef>
+          <a:effectRef idx="0">
+            <a:schemeClr val="accent1"/>
+          </a:effectRef>
+          <a:fontRef idx="minor">
+            <a:schemeClr val="dk1"/>
+          </a:fontRef>
+        </p:style>
+        <p:txBody>
+          <a:bodyPr rtlCol="0" anchor="ctr"/>
+          <a:lstStyle/>
+          <a:p>
+            <a:pPr algn="ctr"/>
+            <a:r>
+              <a:rPr kumimoji="1" lang="en-US" altLang="ja-JP" b="1" dirty="0"/>
+              <a:t>XOR</a:t>
+            </a:r>
+            <a:endParaRPr kumimoji="1" lang="ja-JP" altLang="en-US" b="1" dirty="0"/>
+          </a:p>
+        </p:txBody>
+      </p:sp>
+      <p:sp>
+        <p:nvSpPr>
+          <p:cNvPr id="37" name="四角形: 角を丸くする 36">
+            <a:extLst>
+              <a:ext uri="{FF2B5EF4-FFF2-40B4-BE49-F238E27FC236}">
+                <a16:creationId xmlns:a16="http://schemas.microsoft.com/office/drawing/2014/main" id="{EF9C9B1C-9F70-4D42-BA4B-DB4CDCD18BC4}"/>
+              </a:ext>
+            </a:extLst>
+          </p:cNvPr>
+          <p:cNvSpPr/>
+          <p:nvPr/>
+        </p:nvSpPr>
+        <p:spPr>
+          <a:xfrm>
+            <a:off x="4364611" y="3543854"/>
+            <a:ext cx="2252865" cy="636104"/>
+          </a:xfrm>
+          <a:prstGeom prst="roundRect">
+            <a:avLst/>
+          </a:prstGeom>
+          <a:ln w="38100"/>
+        </p:spPr>
+        <p:style>
+          <a:lnRef idx="2">
+            <a:schemeClr val="accent1"/>
+          </a:lnRef>
+          <a:fillRef idx="1">
+            <a:schemeClr val="lt1"/>
+          </a:fillRef>
+          <a:effectRef idx="0">
+            <a:schemeClr val="accent1"/>
+          </a:effectRef>
+          <a:fontRef idx="minor">
+            <a:schemeClr val="dk1"/>
+          </a:fontRef>
+        </p:style>
+        <p:txBody>
+          <a:bodyPr rtlCol="0" anchor="ctr"/>
+          <a:lstStyle/>
+          <a:p>
+            <a:pPr algn="ctr"/>
+            <a:r>
+              <a:rPr kumimoji="1" lang="en-US" altLang="ja-JP" b="1" dirty="0"/>
+              <a:t>Mask Generation Function</a:t>
+            </a:r>
+            <a:endParaRPr kumimoji="1" lang="ja-JP" altLang="en-US" b="1" dirty="0"/>
+          </a:p>
+        </p:txBody>
+      </p:sp>
+      <p:cxnSp>
+        <p:nvCxnSpPr>
+          <p:cNvPr id="38" name="直線矢印コネクタ 37">
+            <a:extLst>
+              <a:ext uri="{FF2B5EF4-FFF2-40B4-BE49-F238E27FC236}">
+                <a16:creationId xmlns:a16="http://schemas.microsoft.com/office/drawing/2014/main" id="{E933A028-3DB6-4C91-8CDE-FE9B0BE9B919}"/>
+              </a:ext>
+            </a:extLst>
+          </p:cNvPr>
+          <p:cNvCxnSpPr>
+            <a:cxnSpLocks/>
+            <a:stCxn id="37" idx="1"/>
+            <a:endCxn id="34" idx="3"/>
+          </p:cNvCxnSpPr>
+          <p:nvPr/>
+        </p:nvCxnSpPr>
+        <p:spPr>
+          <a:xfrm flipH="1" flipV="1">
+            <a:off x="3648505" y="3853567"/>
+            <a:ext cx="716106" cy="8339"/>
+          </a:xfrm>
+          <a:prstGeom prst="straightConnector1">
+            <a:avLst/>
+          </a:prstGeom>
+          <a:ln w="38100">
+            <a:solidFill>
+              <a:schemeClr val="tx1"/>
+            </a:solidFill>
+            <a:tailEnd type="triangle"/>
+          </a:ln>
+        </p:spPr>
+        <p:style>
+          <a:lnRef idx="1">
+            <a:schemeClr val="accent1"/>
+          </a:lnRef>
+          <a:fillRef idx="0">
+            <a:schemeClr val="accent1"/>
+          </a:fillRef>
+          <a:effectRef idx="0">
+            <a:schemeClr val="accent1"/>
+          </a:effectRef>
+          <a:fontRef idx="minor">
+            <a:schemeClr val="tx1"/>
+          </a:fontRef>
+        </p:style>
+      </p:cxnSp>
+      <p:cxnSp>
+        <p:nvCxnSpPr>
+          <p:cNvPr id="42" name="直線矢印コネクタ 41">
+            <a:extLst>
+              <a:ext uri="{FF2B5EF4-FFF2-40B4-BE49-F238E27FC236}">
+                <a16:creationId xmlns:a16="http://schemas.microsoft.com/office/drawing/2014/main" id="{496A7088-D506-438F-92B1-23126D61384C}"/>
+              </a:ext>
+            </a:extLst>
+          </p:cNvPr>
+          <p:cNvCxnSpPr>
+            <a:cxnSpLocks/>
+            <a:stCxn id="40" idx="2"/>
+            <a:endCxn id="57" idx="0"/>
+          </p:cNvCxnSpPr>
+          <p:nvPr/>
+        </p:nvCxnSpPr>
+        <p:spPr>
+          <a:xfrm>
+            <a:off x="7636241" y="3664394"/>
+            <a:ext cx="0" cy="852576"/>
+          </a:xfrm>
+          <a:prstGeom prst="straightConnector1">
+            <a:avLst/>
+          </a:prstGeom>
+          <a:ln w="38100">
+            <a:solidFill>
+              <a:schemeClr val="tx1"/>
+            </a:solidFill>
+            <a:tailEnd type="triangle"/>
+          </a:ln>
+        </p:spPr>
+        <p:style>
+          <a:lnRef idx="1">
+            <a:schemeClr val="accent1"/>
+          </a:lnRef>
+          <a:fillRef idx="0">
+            <a:schemeClr val="accent1"/>
+          </a:fillRef>
+          <a:effectRef idx="0">
+            <a:schemeClr val="accent1"/>
+          </a:effectRef>
+          <a:fontRef idx="minor">
+            <a:schemeClr val="tx1"/>
+          </a:fontRef>
+        </p:style>
+      </p:cxnSp>
+      <p:cxnSp>
+        <p:nvCxnSpPr>
+          <p:cNvPr id="47" name="直線矢印コネクタ 46">
+            <a:extLst>
+              <a:ext uri="{FF2B5EF4-FFF2-40B4-BE49-F238E27FC236}">
+                <a16:creationId xmlns:a16="http://schemas.microsoft.com/office/drawing/2014/main" id="{3ABF8BEC-E71E-4910-BEE7-58F28CA8EB19}"/>
+              </a:ext>
+            </a:extLst>
+          </p:cNvPr>
+          <p:cNvCxnSpPr>
+            <a:cxnSpLocks/>
+            <a:endCxn id="37" idx="3"/>
+          </p:cNvCxnSpPr>
+          <p:nvPr/>
+        </p:nvCxnSpPr>
+        <p:spPr>
+          <a:xfrm flipH="1">
+            <a:off x="6617476" y="3861906"/>
+            <a:ext cx="1018765" cy="0"/>
+          </a:xfrm>
+          <a:prstGeom prst="straightConnector1">
+            <a:avLst/>
+          </a:prstGeom>
+          <a:ln w="38100">
+            <a:solidFill>
+              <a:schemeClr val="tx1"/>
+            </a:solidFill>
+            <a:tailEnd type="triangle"/>
+          </a:ln>
+        </p:spPr>
+        <p:style>
+          <a:lnRef idx="1">
+            <a:schemeClr val="accent1"/>
+          </a:lnRef>
+          <a:fillRef idx="0">
+            <a:schemeClr val="accent1"/>
+          </a:fillRef>
+          <a:effectRef idx="0">
+            <a:schemeClr val="accent1"/>
+          </a:effectRef>
+          <a:fontRef idx="minor">
+            <a:schemeClr val="tx1"/>
+          </a:fontRef>
+        </p:style>
+      </p:cxnSp>
+      <p:cxnSp>
+        <p:nvCxnSpPr>
+          <p:cNvPr id="49" name="直線矢印コネクタ 48">
+            <a:extLst>
+              <a:ext uri="{FF2B5EF4-FFF2-40B4-BE49-F238E27FC236}">
+                <a16:creationId xmlns:a16="http://schemas.microsoft.com/office/drawing/2014/main" id="{6BF552FB-D65D-464B-9B8C-274493BE1F0E}"/>
+              </a:ext>
+            </a:extLst>
+          </p:cNvPr>
+          <p:cNvCxnSpPr>
+            <a:cxnSpLocks/>
+            <a:stCxn id="34" idx="2"/>
+            <a:endCxn id="52" idx="0"/>
+          </p:cNvCxnSpPr>
+          <p:nvPr/>
+        </p:nvCxnSpPr>
+        <p:spPr>
+          <a:xfrm>
+            <a:off x="3280758" y="4171619"/>
+            <a:ext cx="0" cy="345351"/>
+          </a:xfrm>
+          <a:prstGeom prst="straightConnector1">
+            <a:avLst/>
+          </a:prstGeom>
+          <a:ln w="38100">
+            <a:solidFill>
+              <a:schemeClr val="tx1"/>
+            </a:solidFill>
+            <a:tailEnd type="triangle"/>
+          </a:ln>
+        </p:spPr>
+        <p:style>
+          <a:lnRef idx="1">
+            <a:schemeClr val="accent1"/>
+          </a:lnRef>
+          <a:fillRef idx="0">
+            <a:schemeClr val="accent1"/>
+          </a:fillRef>
+          <a:effectRef idx="0">
+            <a:schemeClr val="accent1"/>
+          </a:effectRef>
+          <a:fontRef idx="minor">
+            <a:schemeClr val="tx1"/>
+          </a:fontRef>
+        </p:style>
+      </p:cxnSp>
+      <p:sp>
+        <p:nvSpPr>
+          <p:cNvPr id="52" name="正方形/長方形 51">
+            <a:extLst>
+              <a:ext uri="{FF2B5EF4-FFF2-40B4-BE49-F238E27FC236}">
+                <a16:creationId xmlns:a16="http://schemas.microsoft.com/office/drawing/2014/main" id="{FD07EE77-DCE9-471C-B418-66899C8BB890}"/>
+              </a:ext>
+            </a:extLst>
+          </p:cNvPr>
+          <p:cNvSpPr/>
+          <p:nvPr/>
+        </p:nvSpPr>
+        <p:spPr>
+          <a:xfrm>
+            <a:off x="2267590" y="4516970"/>
+            <a:ext cx="2026335" cy="437322"/>
+          </a:xfrm>
+          <a:prstGeom prst="rect">
+            <a:avLst/>
+          </a:prstGeom>
+          <a:solidFill>
+            <a:schemeClr val="bg1"/>
+          </a:solidFill>
+          <a:ln w="38100">
+            <a:solidFill>
+              <a:schemeClr val="tx1"/>
+            </a:solidFill>
+          </a:ln>
+        </p:spPr>
+        <p:style>
+          <a:lnRef idx="2">
+            <a:schemeClr val="accent1">
+              <a:shade val="50000"/>
+            </a:schemeClr>
+          </a:lnRef>
+          <a:fillRef idx="1">
+            <a:schemeClr val="accent1"/>
+          </a:fillRef>
+          <a:effectRef idx="0">
+            <a:schemeClr val="accent1"/>
+          </a:effectRef>
+          <a:fontRef idx="minor">
+            <a:schemeClr val="lt1"/>
+          </a:fontRef>
+        </p:style>
+        <p:txBody>
+          <a:bodyPr rtlCol="0" anchor="ctr"/>
+          <a:lstStyle/>
+          <a:p>
+            <a:pPr algn="ctr"/>
+            <a:r>
+              <a:rPr kumimoji="1" lang="en-US" altLang="ja-JP" sz="1600" b="1" dirty="0">
+                <a:solidFill>
+                  <a:schemeClr val="tx1"/>
+                </a:solidFill>
+              </a:rPr>
+              <a:t>Masked Data Block</a:t>
+            </a:r>
+          </a:p>
+        </p:txBody>
+      </p:sp>
+      <p:sp>
+        <p:nvSpPr>
+          <p:cNvPr id="53" name="正方形/長方形 52">
+            <a:extLst>
+              <a:ext uri="{FF2B5EF4-FFF2-40B4-BE49-F238E27FC236}">
+                <a16:creationId xmlns:a16="http://schemas.microsoft.com/office/drawing/2014/main" id="{28D0FC10-379C-4A19-8590-0EA3757B0320}"/>
+              </a:ext>
+            </a:extLst>
+          </p:cNvPr>
+          <p:cNvSpPr/>
+          <p:nvPr/>
+        </p:nvSpPr>
+        <p:spPr>
+          <a:xfrm>
+            <a:off x="6621354" y="1851478"/>
+            <a:ext cx="1814624" cy="437322"/>
+          </a:xfrm>
+          <a:prstGeom prst="rect">
+            <a:avLst/>
+          </a:prstGeom>
+          <a:solidFill>
+            <a:schemeClr val="bg1"/>
+          </a:solidFill>
+          <a:ln w="38100">
+            <a:solidFill>
+              <a:schemeClr val="tx1"/>
+            </a:solidFill>
+          </a:ln>
+        </p:spPr>
+        <p:style>
+          <a:lnRef idx="2">
+            <a:schemeClr val="accent1">
+              <a:shade val="50000"/>
+            </a:schemeClr>
+          </a:lnRef>
+          <a:fillRef idx="1">
+            <a:schemeClr val="accent1"/>
+          </a:fillRef>
+          <a:effectRef idx="0">
+            <a:schemeClr val="accent1"/>
+          </a:effectRef>
+          <a:fontRef idx="minor">
+            <a:schemeClr val="lt1"/>
+          </a:fontRef>
+        </p:style>
+        <p:txBody>
+          <a:bodyPr rtlCol="0" anchor="ctr"/>
+          <a:lstStyle/>
+          <a:p>
+            <a:pPr algn="ctr"/>
+            <a:r>
+              <a:rPr kumimoji="1" lang="en-US" altLang="ja-JP" b="1" dirty="0">
+                <a:solidFill>
+                  <a:schemeClr val="tx1"/>
+                </a:solidFill>
+              </a:rPr>
+              <a:t>Hash</a:t>
+            </a:r>
+            <a:endParaRPr kumimoji="1" lang="ja-JP" altLang="en-US" b="1" dirty="0">
+              <a:solidFill>
+                <a:schemeClr val="tx1"/>
+              </a:solidFill>
+            </a:endParaRPr>
+          </a:p>
+        </p:txBody>
+      </p:sp>
+      <p:sp>
+        <p:nvSpPr>
+          <p:cNvPr id="54" name="右中かっこ 53">
+            <a:extLst>
+              <a:ext uri="{FF2B5EF4-FFF2-40B4-BE49-F238E27FC236}">
+                <a16:creationId xmlns:a16="http://schemas.microsoft.com/office/drawing/2014/main" id="{63A9A22F-D301-4D25-A46F-D6C0BB7C2E11}"/>
+              </a:ext>
+            </a:extLst>
+          </p:cNvPr>
+          <p:cNvSpPr/>
+          <p:nvPr/>
+        </p:nvSpPr>
+        <p:spPr>
+          <a:xfrm rot="5400000">
+            <a:off x="5873005" y="1458077"/>
+            <a:ext cx="205766" cy="7416598"/>
+          </a:xfrm>
+          <a:prstGeom prst="rightBrace">
+            <a:avLst>
+              <a:gd name="adj1" fmla="val 57767"/>
+              <a:gd name="adj2" fmla="val 50000"/>
+            </a:avLst>
+          </a:prstGeom>
+          <a:ln w="19050">
+            <a:solidFill>
+              <a:schemeClr val="tx1"/>
+            </a:solidFill>
+          </a:ln>
+        </p:spPr>
+        <p:style>
+          <a:lnRef idx="1">
+            <a:schemeClr val="accent1"/>
+          </a:lnRef>
+          <a:fillRef idx="0">
+            <a:schemeClr val="accent1"/>
+          </a:fillRef>
+          <a:effectRef idx="0">
+            <a:schemeClr val="accent1"/>
+          </a:effectRef>
+          <a:fontRef idx="minor">
+            <a:schemeClr val="tx1"/>
+          </a:fontRef>
+        </p:style>
+        <p:txBody>
+          <a:bodyPr rtlCol="0" anchor="ctr"/>
+          <a:lstStyle/>
+          <a:p>
+            <a:pPr algn="ctr"/>
+            <a:endParaRPr kumimoji="1" lang="ja-JP" altLang="en-US" b="1"/>
+          </a:p>
+        </p:txBody>
+      </p:sp>
+      <p:sp>
+        <p:nvSpPr>
+          <p:cNvPr id="55" name="テキスト ボックス 54">
+            <a:extLst>
+              <a:ext uri="{FF2B5EF4-FFF2-40B4-BE49-F238E27FC236}">
+                <a16:creationId xmlns:a16="http://schemas.microsoft.com/office/drawing/2014/main" id="{E966A0A1-A712-4AD7-9813-7C3AF7F8A4CF}"/>
+              </a:ext>
+            </a:extLst>
+          </p:cNvPr>
+          <p:cNvSpPr txBox="1"/>
+          <p:nvPr/>
+        </p:nvSpPr>
+        <p:spPr>
+          <a:xfrm>
+            <a:off x="4457619" y="5236930"/>
+            <a:ext cx="3036537" cy="369332"/>
+          </a:xfrm>
+          <a:prstGeom prst="rect">
+            <a:avLst/>
+          </a:prstGeom>
+          <a:noFill/>
+        </p:spPr>
+        <p:txBody>
+          <a:bodyPr wrap="none" rtlCol="0">
+            <a:spAutoFit/>
+          </a:bodyPr>
+          <a:lstStyle/>
+          <a:p>
+            <a:r>
+              <a:rPr kumimoji="1" lang="en-US" altLang="ja-JP" b="1" dirty="0"/>
+              <a:t>Padded data </a:t>
+            </a:r>
+            <a:r>
+              <a:rPr kumimoji="1" lang="en-US" altLang="ja-JP" b="1" i="1" dirty="0"/>
+              <a:t>m</a:t>
+            </a:r>
+            <a:r>
+              <a:rPr kumimoji="1" lang="en-US" altLang="ja-JP" b="1" dirty="0"/>
+              <a:t> </a:t>
+            </a:r>
+            <a:r>
+              <a:rPr kumimoji="1" lang="en-US" altLang="ja-JP" b="1" i="1" dirty="0"/>
+              <a:t> </a:t>
+            </a:r>
+            <a:r>
+              <a:rPr kumimoji="1" lang="en-US" altLang="ja-JP" b="1" dirty="0"/>
+              <a:t>(to be signed)</a:t>
+            </a:r>
+            <a:endParaRPr kumimoji="1" lang="ja-JP" altLang="en-US" b="1" dirty="0"/>
+          </a:p>
+        </p:txBody>
+      </p:sp>
+      <p:sp>
+        <p:nvSpPr>
+          <p:cNvPr id="27" name="四角形: 角を丸くする 21">
+            <a:extLst>
+              <a:ext uri="{FF2B5EF4-FFF2-40B4-BE49-F238E27FC236}">
+                <a16:creationId xmlns:a16="http://schemas.microsoft.com/office/drawing/2014/main" id="{CD6E697C-E64F-3A4D-85BA-7E089F34218D}"/>
+              </a:ext>
+            </a:extLst>
+          </p:cNvPr>
+          <p:cNvSpPr/>
+          <p:nvPr/>
+        </p:nvSpPr>
+        <p:spPr>
+          <a:xfrm>
+            <a:off x="7160919" y="923827"/>
+            <a:ext cx="735494" cy="636104"/>
+          </a:xfrm>
+          <a:prstGeom prst="roundRect">
+            <a:avLst/>
+          </a:prstGeom>
+          <a:ln w="38100"/>
+        </p:spPr>
+        <p:style>
+          <a:lnRef idx="2">
+            <a:schemeClr val="accent1"/>
+          </a:lnRef>
+          <a:fillRef idx="1">
+            <a:schemeClr val="lt1"/>
+          </a:fillRef>
+          <a:effectRef idx="0">
+            <a:schemeClr val="accent1"/>
+          </a:effectRef>
+          <a:fontRef idx="minor">
+            <a:schemeClr val="dk1"/>
+          </a:fontRef>
+        </p:style>
+        <p:txBody>
+          <a:bodyPr rtlCol="0" anchor="ctr"/>
+          <a:lstStyle/>
+          <a:p>
+            <a:pPr algn="ctr"/>
+            <a:r>
+              <a:rPr kumimoji="1" lang="en-US" altLang="ja-JP" b="1" dirty="0"/>
+              <a:t>Hash</a:t>
+            </a:r>
+          </a:p>
+          <a:p>
+            <a:pPr algn="ctr"/>
+            <a:r>
+              <a:rPr kumimoji="1" lang="en-US" altLang="ja-JP" b="1" dirty="0" err="1"/>
+              <a:t>Func</a:t>
+            </a:r>
+            <a:endParaRPr kumimoji="1" lang="ja-JP" altLang="en-US" b="1" dirty="0"/>
+          </a:p>
+        </p:txBody>
+      </p:sp>
+      <p:cxnSp>
+        <p:nvCxnSpPr>
+          <p:cNvPr id="29" name="直線矢印コネクタ 16">
+            <a:extLst>
+              <a:ext uri="{FF2B5EF4-FFF2-40B4-BE49-F238E27FC236}">
+                <a16:creationId xmlns:a16="http://schemas.microsoft.com/office/drawing/2014/main" id="{A4ADE102-FC40-954C-8DD1-CEB660719C1B}"/>
+              </a:ext>
+            </a:extLst>
+          </p:cNvPr>
+          <p:cNvCxnSpPr>
+            <a:cxnSpLocks/>
+            <a:endCxn id="27" idx="0"/>
+          </p:cNvCxnSpPr>
+          <p:nvPr/>
+        </p:nvCxnSpPr>
+        <p:spPr>
+          <a:xfrm>
+            <a:off x="7528666" y="567960"/>
+            <a:ext cx="0" cy="355867"/>
+          </a:xfrm>
+          <a:prstGeom prst="straightConnector1">
+            <a:avLst/>
+          </a:prstGeom>
+          <a:ln w="38100">
+            <a:solidFill>
+              <a:schemeClr val="tx1"/>
+            </a:solidFill>
+            <a:tailEnd type="triangle"/>
+          </a:ln>
+        </p:spPr>
+        <p:style>
+          <a:lnRef idx="1">
+            <a:schemeClr val="accent1"/>
+          </a:lnRef>
+          <a:fillRef idx="0">
+            <a:schemeClr val="accent1"/>
+          </a:fillRef>
+          <a:effectRef idx="0">
+            <a:schemeClr val="accent1"/>
+          </a:effectRef>
+          <a:fontRef idx="minor">
+            <a:schemeClr val="tx1"/>
+          </a:fontRef>
+        </p:style>
+      </p:cxnSp>
+      <p:cxnSp>
+        <p:nvCxnSpPr>
+          <p:cNvPr id="30" name="直線矢印コネクタ 16">
+            <a:extLst>
+              <a:ext uri="{FF2B5EF4-FFF2-40B4-BE49-F238E27FC236}">
+                <a16:creationId xmlns:a16="http://schemas.microsoft.com/office/drawing/2014/main" id="{B4A4A702-6AA2-D944-90FB-083515799D46}"/>
+              </a:ext>
+            </a:extLst>
+          </p:cNvPr>
+          <p:cNvCxnSpPr>
+            <a:cxnSpLocks/>
+            <a:stCxn id="27" idx="2"/>
+            <a:endCxn id="53" idx="0"/>
+          </p:cNvCxnSpPr>
+          <p:nvPr/>
+        </p:nvCxnSpPr>
+        <p:spPr>
+          <a:xfrm>
+            <a:off x="7528666" y="1559931"/>
+            <a:ext cx="0" cy="291547"/>
+          </a:xfrm>
+          <a:prstGeom prst="straightConnector1">
+            <a:avLst/>
+          </a:prstGeom>
+          <a:ln w="38100">
+            <a:solidFill>
+              <a:schemeClr val="tx1"/>
+            </a:solidFill>
+            <a:tailEnd type="triangle"/>
+          </a:ln>
+        </p:spPr>
+        <p:style>
+          <a:lnRef idx="1">
+            <a:schemeClr val="accent1"/>
+          </a:lnRef>
+          <a:fillRef idx="0">
+            <a:schemeClr val="accent1"/>
+          </a:fillRef>
+          <a:effectRef idx="0">
+            <a:schemeClr val="accent1"/>
+          </a:effectRef>
+          <a:fontRef idx="minor">
+            <a:schemeClr val="tx1"/>
+          </a:fontRef>
+        </p:style>
+      </p:cxnSp>
+      <p:sp>
+        <p:nvSpPr>
+          <p:cNvPr id="35" name="右中かっこ 53">
+            <a:extLst>
+              <a:ext uri="{FF2B5EF4-FFF2-40B4-BE49-F238E27FC236}">
+                <a16:creationId xmlns:a16="http://schemas.microsoft.com/office/drawing/2014/main" id="{CAFBD647-23F8-9648-81FA-0B402446A2A3}"/>
+              </a:ext>
+            </a:extLst>
+          </p:cNvPr>
+          <p:cNvSpPr/>
+          <p:nvPr/>
+        </p:nvSpPr>
+        <p:spPr>
+          <a:xfrm rot="5400000">
+            <a:off x="7481625" y="349050"/>
+            <a:ext cx="311252" cy="4392903"/>
+          </a:xfrm>
+          <a:prstGeom prst="rightBrace">
+            <a:avLst>
+              <a:gd name="adj1" fmla="val 57767"/>
+              <a:gd name="adj2" fmla="val 50000"/>
+            </a:avLst>
+          </a:prstGeom>
+          <a:ln w="19050">
+            <a:solidFill>
+              <a:schemeClr val="tx1"/>
+            </a:solidFill>
+          </a:ln>
+        </p:spPr>
+        <p:style>
+          <a:lnRef idx="1">
+            <a:schemeClr val="accent1"/>
+          </a:lnRef>
+          <a:fillRef idx="0">
+            <a:schemeClr val="accent1"/>
+          </a:fillRef>
+          <a:effectRef idx="0">
+            <a:schemeClr val="accent1"/>
+          </a:effectRef>
+          <a:fontRef idx="minor">
+            <a:schemeClr val="tx1"/>
+          </a:fontRef>
+        </p:style>
+        <p:txBody>
+          <a:bodyPr rtlCol="0" anchor="ctr"/>
+          <a:lstStyle/>
+          <a:p>
+            <a:pPr algn="ctr"/>
+            <a:endParaRPr kumimoji="1" lang="ja-JP" altLang="en-US" b="1"/>
+          </a:p>
+        </p:txBody>
+      </p:sp>
+      <p:sp>
+        <p:nvSpPr>
+          <p:cNvPr id="40" name="四角形: 角を丸くする 21">
+            <a:extLst>
+              <a:ext uri="{FF2B5EF4-FFF2-40B4-BE49-F238E27FC236}">
+                <a16:creationId xmlns:a16="http://schemas.microsoft.com/office/drawing/2014/main" id="{9D50EB6D-EA63-2543-A0B4-ADA4B2F9EBE2}"/>
+              </a:ext>
+            </a:extLst>
+          </p:cNvPr>
+          <p:cNvSpPr/>
+          <p:nvPr/>
+        </p:nvSpPr>
+        <p:spPr>
+          <a:xfrm>
+            <a:off x="7268494" y="3028290"/>
+            <a:ext cx="735494" cy="636104"/>
+          </a:xfrm>
+          <a:prstGeom prst="roundRect">
+            <a:avLst/>
+          </a:prstGeom>
+          <a:ln w="38100"/>
+        </p:spPr>
+        <p:style>
+          <a:lnRef idx="2">
+            <a:schemeClr val="accent1"/>
+          </a:lnRef>
+          <a:fillRef idx="1">
+            <a:schemeClr val="lt1"/>
+          </a:fillRef>
+          <a:effectRef idx="0">
+            <a:schemeClr val="accent1"/>
+          </a:effectRef>
+          <a:fontRef idx="minor">
+            <a:schemeClr val="dk1"/>
+          </a:fontRef>
+        </p:style>
+        <p:txBody>
+          <a:bodyPr rtlCol="0" anchor="ctr"/>
+          <a:lstStyle/>
+          <a:p>
+            <a:pPr algn="ctr"/>
+            <a:r>
+              <a:rPr kumimoji="1" lang="en-US" altLang="ja-JP" b="1" dirty="0"/>
+              <a:t>Hash</a:t>
+            </a:r>
+          </a:p>
+          <a:p>
+            <a:pPr algn="ctr"/>
+            <a:r>
+              <a:rPr kumimoji="1" lang="en-US" altLang="ja-JP" b="1" dirty="0" err="1"/>
+              <a:t>Func</a:t>
+            </a:r>
+            <a:endParaRPr kumimoji="1" lang="ja-JP" altLang="en-US" b="1" dirty="0"/>
+          </a:p>
+        </p:txBody>
+      </p:sp>
+      <p:sp>
+        <p:nvSpPr>
+          <p:cNvPr id="46" name="右中かっこ 53">
+            <a:extLst>
+              <a:ext uri="{FF2B5EF4-FFF2-40B4-BE49-F238E27FC236}">
+                <a16:creationId xmlns:a16="http://schemas.microsoft.com/office/drawing/2014/main" id="{70A23217-F7C5-2448-B5AD-0689DFE2D362}"/>
+              </a:ext>
+            </a:extLst>
+          </p:cNvPr>
+          <p:cNvSpPr/>
+          <p:nvPr/>
+        </p:nvSpPr>
+        <p:spPr>
+          <a:xfrm rot="5400000">
+            <a:off x="3125131" y="931877"/>
+            <a:ext cx="311252" cy="3227251"/>
+          </a:xfrm>
+          <a:prstGeom prst="rightBrace">
+            <a:avLst>
+              <a:gd name="adj1" fmla="val 57767"/>
+              <a:gd name="adj2" fmla="val 50000"/>
+            </a:avLst>
+          </a:prstGeom>
+          <a:ln w="19050">
+            <a:solidFill>
+              <a:schemeClr val="tx1"/>
+            </a:solidFill>
+          </a:ln>
+        </p:spPr>
+        <p:style>
+          <a:lnRef idx="1">
+            <a:schemeClr val="accent1"/>
+          </a:lnRef>
+          <a:fillRef idx="0">
+            <a:schemeClr val="accent1"/>
+          </a:fillRef>
+          <a:effectRef idx="0">
+            <a:schemeClr val="accent1"/>
+          </a:effectRef>
+          <a:fontRef idx="minor">
+            <a:schemeClr val="tx1"/>
+          </a:fontRef>
+        </p:style>
+        <p:txBody>
+          <a:bodyPr rtlCol="0" anchor="ctr"/>
+          <a:lstStyle/>
+          <a:p>
+            <a:pPr algn="ctr"/>
+            <a:endParaRPr kumimoji="1" lang="ja-JP" altLang="en-US" b="1"/>
+          </a:p>
+        </p:txBody>
+      </p:sp>
+      <p:sp>
+        <p:nvSpPr>
+          <p:cNvPr id="48" name="正方形/長方形 10">
+            <a:extLst>
+              <a:ext uri="{FF2B5EF4-FFF2-40B4-BE49-F238E27FC236}">
+                <a16:creationId xmlns:a16="http://schemas.microsoft.com/office/drawing/2014/main" id="{0AD61696-9150-FA4E-AC0A-B3658EE0D46B}"/>
+              </a:ext>
+            </a:extLst>
+          </p:cNvPr>
+          <p:cNvSpPr/>
+          <p:nvPr/>
+        </p:nvSpPr>
+        <p:spPr>
+          <a:xfrm>
+            <a:off x="8572922" y="1854147"/>
+            <a:ext cx="1260781" cy="437322"/>
+          </a:xfrm>
+          <a:prstGeom prst="rect">
+            <a:avLst/>
+          </a:prstGeom>
+          <a:solidFill>
+            <a:schemeClr val="bg1"/>
+          </a:solidFill>
+          <a:ln w="38100">
+            <a:solidFill>
+              <a:schemeClr val="tx1"/>
+            </a:solidFill>
+          </a:ln>
+        </p:spPr>
+        <p:style>
+          <a:lnRef idx="2">
+            <a:schemeClr val="accent1">
+              <a:shade val="50000"/>
+            </a:schemeClr>
+          </a:lnRef>
+          <a:fillRef idx="1">
+            <a:schemeClr val="accent1"/>
+          </a:fillRef>
+          <a:effectRef idx="0">
+            <a:schemeClr val="accent1"/>
+          </a:effectRef>
+          <a:fontRef idx="minor">
+            <a:schemeClr val="lt1"/>
+          </a:fontRef>
+        </p:style>
+        <p:txBody>
+          <a:bodyPr rtlCol="0" anchor="ctr"/>
+          <a:lstStyle/>
+          <a:p>
+            <a:pPr algn="ctr"/>
+            <a:r>
+              <a:rPr kumimoji="1" lang="en-US" altLang="ja-JP" sz="1600" b="1" dirty="0">
+                <a:solidFill>
+                  <a:schemeClr val="tx1"/>
+                </a:solidFill>
+              </a:rPr>
+              <a:t>Random</a:t>
+            </a:r>
+          </a:p>
+          <a:p>
+            <a:pPr algn="ctr"/>
+            <a:r>
+              <a:rPr kumimoji="1" lang="en-US" altLang="ja-JP" sz="1600" b="1" dirty="0">
+                <a:solidFill>
+                  <a:schemeClr val="tx1"/>
+                </a:solidFill>
+              </a:rPr>
+              <a:t>Octet (Salt)</a:t>
+            </a:r>
+            <a:endParaRPr kumimoji="1" lang="ja-JP" altLang="en-US" sz="1600" b="1" dirty="0">
+              <a:solidFill>
+                <a:schemeClr val="tx1"/>
+              </a:solidFill>
+            </a:endParaRPr>
+          </a:p>
+        </p:txBody>
+      </p:sp>
+      <p:sp>
+        <p:nvSpPr>
+          <p:cNvPr id="57" name="正方形/長方形 52">
+            <a:extLst>
+              <a:ext uri="{FF2B5EF4-FFF2-40B4-BE49-F238E27FC236}">
+                <a16:creationId xmlns:a16="http://schemas.microsoft.com/office/drawing/2014/main" id="{04D34A3D-5C67-3644-91C5-DA068A00F5AB}"/>
+              </a:ext>
+            </a:extLst>
+          </p:cNvPr>
+          <p:cNvSpPr/>
+          <p:nvPr/>
+        </p:nvSpPr>
+        <p:spPr>
+          <a:xfrm>
+            <a:off x="6728929" y="4516970"/>
+            <a:ext cx="1814624" cy="437322"/>
+          </a:xfrm>
+          <a:prstGeom prst="rect">
+            <a:avLst/>
+          </a:prstGeom>
+          <a:solidFill>
+            <a:schemeClr val="bg1"/>
+          </a:solidFill>
+          <a:ln w="38100">
+            <a:solidFill>
+              <a:schemeClr val="tx1"/>
+            </a:solidFill>
+          </a:ln>
+        </p:spPr>
+        <p:style>
+          <a:lnRef idx="2">
+            <a:schemeClr val="accent1">
+              <a:shade val="50000"/>
+            </a:schemeClr>
+          </a:lnRef>
+          <a:fillRef idx="1">
+            <a:schemeClr val="accent1"/>
+          </a:fillRef>
+          <a:effectRef idx="0">
+            <a:schemeClr val="accent1"/>
+          </a:effectRef>
+          <a:fontRef idx="minor">
+            <a:schemeClr val="lt1"/>
+          </a:fontRef>
+        </p:style>
+        <p:txBody>
+          <a:bodyPr rtlCol="0" anchor="ctr"/>
+          <a:lstStyle/>
+          <a:p>
+            <a:pPr algn="ctr"/>
+            <a:r>
+              <a:rPr kumimoji="1" lang="en-US" altLang="ja-JP" b="1" dirty="0">
+                <a:solidFill>
+                  <a:schemeClr val="tx1"/>
+                </a:solidFill>
+              </a:rPr>
+              <a:t>Hash</a:t>
+            </a:r>
+            <a:endParaRPr kumimoji="1" lang="ja-JP" altLang="en-US" b="1" dirty="0">
+              <a:solidFill>
+                <a:schemeClr val="tx1"/>
+              </a:solidFill>
+            </a:endParaRPr>
+          </a:p>
+        </p:txBody>
+      </p:sp>
+      <p:sp>
+        <p:nvSpPr>
+          <p:cNvPr id="65" name="正方形/長方形 6">
+            <a:extLst>
+              <a:ext uri="{FF2B5EF4-FFF2-40B4-BE49-F238E27FC236}">
+                <a16:creationId xmlns:a16="http://schemas.microsoft.com/office/drawing/2014/main" id="{6C12C218-4725-8F45-BBBA-796C10A6D89F}"/>
+              </a:ext>
+            </a:extLst>
+          </p:cNvPr>
+          <p:cNvSpPr/>
+          <p:nvPr/>
+        </p:nvSpPr>
+        <p:spPr>
+          <a:xfrm>
+            <a:off x="1648089" y="1849919"/>
+            <a:ext cx="1043609" cy="437322"/>
+          </a:xfrm>
+          <a:prstGeom prst="rect">
+            <a:avLst/>
+          </a:prstGeom>
+          <a:solidFill>
+            <a:schemeClr val="bg1"/>
+          </a:solidFill>
+          <a:ln w="38100">
+            <a:solidFill>
+              <a:schemeClr val="tx1"/>
+            </a:solidFill>
+          </a:ln>
+        </p:spPr>
+        <p:style>
+          <a:lnRef idx="2">
+            <a:schemeClr val="accent1">
+              <a:shade val="50000"/>
+            </a:schemeClr>
+          </a:lnRef>
+          <a:fillRef idx="1">
+            <a:schemeClr val="accent1"/>
+          </a:fillRef>
+          <a:effectRef idx="0">
+            <a:schemeClr val="accent1"/>
+          </a:effectRef>
+          <a:fontRef idx="minor">
+            <a:schemeClr val="lt1"/>
+          </a:fontRef>
+        </p:style>
+        <p:txBody>
+          <a:bodyPr rtlCol="0" anchor="ctr"/>
+          <a:lstStyle/>
+          <a:p>
+            <a:pPr algn="ctr"/>
+            <a:r>
+              <a:rPr kumimoji="1" lang="en-US" altLang="ja-JP" b="1" dirty="0">
+                <a:solidFill>
+                  <a:schemeClr val="tx1"/>
+                </a:solidFill>
+              </a:rPr>
+              <a:t>0x00…</a:t>
+            </a:r>
+            <a:endParaRPr kumimoji="1" lang="ja-JP" altLang="en-US" b="1" i="1" dirty="0">
+              <a:solidFill>
+                <a:schemeClr val="tx1"/>
+              </a:solidFill>
+            </a:endParaRPr>
+          </a:p>
+        </p:txBody>
+      </p:sp>
+      <p:sp>
+        <p:nvSpPr>
+          <p:cNvPr id="71" name="Line Callout 2 (Accent Bar) 70">
+            <a:extLst>
+              <a:ext uri="{FF2B5EF4-FFF2-40B4-BE49-F238E27FC236}">
+                <a16:creationId xmlns:a16="http://schemas.microsoft.com/office/drawing/2014/main" id="{26DDBB7F-85A8-1044-A47C-284D8ED79D3D}"/>
+              </a:ext>
+            </a:extLst>
+          </p:cNvPr>
+          <p:cNvSpPr/>
+          <p:nvPr/>
+        </p:nvSpPr>
+        <p:spPr>
+          <a:xfrm>
+            <a:off x="4767051" y="1299686"/>
+            <a:ext cx="1049147" cy="437322"/>
+          </a:xfrm>
+          <a:prstGeom prst="accentCallout2">
+            <a:avLst>
+              <a:gd name="adj1" fmla="val 18750"/>
+              <a:gd name="adj2" fmla="val 94205"/>
+              <a:gd name="adj3" fmla="val 18750"/>
+              <a:gd name="adj4" fmla="val 103302"/>
+              <a:gd name="adj5" fmla="val 156779"/>
+              <a:gd name="adj6" fmla="val 144053"/>
+            </a:avLst>
+          </a:prstGeom>
+          <a:noFill/>
+        </p:spPr>
+        <p:style>
+          <a:lnRef idx="2">
+            <a:schemeClr val="accent1">
+              <a:shade val="50000"/>
+            </a:schemeClr>
+          </a:lnRef>
+          <a:fillRef idx="1">
+            <a:schemeClr val="accent1"/>
+          </a:fillRef>
+          <a:effectRef idx="0">
+            <a:schemeClr val="accent1"/>
+          </a:effectRef>
+          <a:fontRef idx="minor">
+            <a:schemeClr val="lt1"/>
+          </a:fontRef>
+        </p:style>
+        <p:txBody>
+          <a:bodyPr rtlCol="0" anchor="ctr"/>
+          <a:lstStyle/>
+          <a:p>
+            <a:pPr algn="ctr"/>
+            <a:r>
+              <a:rPr lang="en-US" dirty="0">
+                <a:solidFill>
+                  <a:schemeClr val="tx1"/>
+                </a:solidFill>
+              </a:rPr>
+              <a:t>8 bytes</a:t>
+            </a:r>
+          </a:p>
+        </p:txBody>
+      </p:sp>
+      <p:sp>
+        <p:nvSpPr>
+          <p:cNvPr id="74" name="正方形/長方形 6">
+            <a:extLst>
+              <a:ext uri="{FF2B5EF4-FFF2-40B4-BE49-F238E27FC236}">
+                <a16:creationId xmlns:a16="http://schemas.microsoft.com/office/drawing/2014/main" id="{DB58B4C7-554F-2144-B4AE-E2ABDCC61F0B}"/>
+              </a:ext>
+            </a:extLst>
+          </p:cNvPr>
+          <p:cNvSpPr/>
+          <p:nvPr/>
+        </p:nvSpPr>
+        <p:spPr>
+          <a:xfrm>
+            <a:off x="2850700" y="1849919"/>
+            <a:ext cx="646197" cy="437322"/>
+          </a:xfrm>
+          <a:prstGeom prst="rect">
+            <a:avLst/>
+          </a:prstGeom>
+          <a:solidFill>
+            <a:schemeClr val="bg1"/>
+          </a:solidFill>
+          <a:ln w="38100">
+            <a:solidFill>
+              <a:schemeClr val="tx1"/>
+            </a:solidFill>
+          </a:ln>
+        </p:spPr>
+        <p:style>
+          <a:lnRef idx="2">
+            <a:schemeClr val="accent1">
+              <a:shade val="50000"/>
+            </a:schemeClr>
+          </a:lnRef>
+          <a:fillRef idx="1">
+            <a:schemeClr val="accent1"/>
+          </a:fillRef>
+          <a:effectRef idx="0">
+            <a:schemeClr val="accent1"/>
+          </a:effectRef>
+          <a:fontRef idx="minor">
+            <a:schemeClr val="lt1"/>
+          </a:fontRef>
+        </p:style>
+        <p:txBody>
+          <a:bodyPr rtlCol="0" anchor="ctr"/>
+          <a:lstStyle/>
+          <a:p>
+            <a:pPr algn="ctr"/>
+            <a:r>
+              <a:rPr kumimoji="1" lang="en-US" altLang="ja-JP" b="1" dirty="0">
+                <a:solidFill>
+                  <a:schemeClr val="tx1"/>
+                </a:solidFill>
+              </a:rPr>
+              <a:t>0x01</a:t>
+            </a:r>
+            <a:endParaRPr kumimoji="1" lang="ja-JP" altLang="en-US" b="1" dirty="0">
+              <a:solidFill>
+                <a:schemeClr val="tx1"/>
+              </a:solidFill>
+            </a:endParaRPr>
+          </a:p>
+        </p:txBody>
+      </p:sp>
+      <p:sp>
+        <p:nvSpPr>
+          <p:cNvPr id="75" name="正方形/長方形 52">
+            <a:extLst>
+              <a:ext uri="{FF2B5EF4-FFF2-40B4-BE49-F238E27FC236}">
+                <a16:creationId xmlns:a16="http://schemas.microsoft.com/office/drawing/2014/main" id="{68FF0E52-90B0-4242-A7A0-9DA498A36E42}"/>
+              </a:ext>
+            </a:extLst>
+          </p:cNvPr>
+          <p:cNvSpPr/>
+          <p:nvPr/>
+        </p:nvSpPr>
+        <p:spPr>
+          <a:xfrm>
+            <a:off x="8774675" y="4516970"/>
+            <a:ext cx="907207" cy="437322"/>
+          </a:xfrm>
+          <a:prstGeom prst="rect">
+            <a:avLst/>
+          </a:prstGeom>
+          <a:solidFill>
+            <a:schemeClr val="bg1"/>
+          </a:solidFill>
+          <a:ln w="38100">
+            <a:solidFill>
+              <a:schemeClr val="tx1"/>
+            </a:solidFill>
+          </a:ln>
+        </p:spPr>
+        <p:style>
+          <a:lnRef idx="2">
+            <a:schemeClr val="accent1">
+              <a:shade val="50000"/>
+            </a:schemeClr>
+          </a:lnRef>
+          <a:fillRef idx="1">
+            <a:schemeClr val="accent1"/>
+          </a:fillRef>
+          <a:effectRef idx="0">
+            <a:schemeClr val="accent1"/>
+          </a:effectRef>
+          <a:fontRef idx="minor">
+            <a:schemeClr val="lt1"/>
+          </a:fontRef>
+        </p:style>
+        <p:txBody>
+          <a:bodyPr rtlCol="0" anchor="ctr"/>
+          <a:lstStyle/>
+          <a:p>
+            <a:pPr algn="ctr"/>
+            <a:r>
+              <a:rPr kumimoji="1" lang="en-US" altLang="ja-JP" b="1" dirty="0">
+                <a:solidFill>
+                  <a:schemeClr val="tx1"/>
+                </a:solidFill>
+              </a:rPr>
+              <a:t>0xBC</a:t>
+            </a:r>
+            <a:endParaRPr kumimoji="1" lang="ja-JP" altLang="en-US" b="1" dirty="0">
+              <a:solidFill>
+                <a:schemeClr val="tx1"/>
+              </a:solidFill>
+            </a:endParaRPr>
+          </a:p>
+        </p:txBody>
+      </p:sp>
+      <p:sp>
+        <p:nvSpPr>
+          <p:cNvPr id="76" name="正方形/長方形 10">
+            <a:extLst>
+              <a:ext uri="{FF2B5EF4-FFF2-40B4-BE49-F238E27FC236}">
+                <a16:creationId xmlns:a16="http://schemas.microsoft.com/office/drawing/2014/main" id="{D375F7B7-03B3-EF48-8F26-69AFE171F85A}"/>
+              </a:ext>
+            </a:extLst>
+          </p:cNvPr>
+          <p:cNvSpPr/>
+          <p:nvPr/>
+        </p:nvSpPr>
+        <p:spPr>
+          <a:xfrm>
+            <a:off x="3633602" y="1849919"/>
+            <a:ext cx="1260781" cy="437322"/>
+          </a:xfrm>
+          <a:prstGeom prst="rect">
+            <a:avLst/>
+          </a:prstGeom>
+          <a:solidFill>
+            <a:schemeClr val="bg1"/>
+          </a:solidFill>
+          <a:ln w="38100">
+            <a:solidFill>
+              <a:schemeClr val="tx1"/>
+            </a:solidFill>
+          </a:ln>
+        </p:spPr>
+        <p:style>
+          <a:lnRef idx="2">
+            <a:schemeClr val="accent1">
+              <a:shade val="50000"/>
+            </a:schemeClr>
+          </a:lnRef>
+          <a:fillRef idx="1">
+            <a:schemeClr val="accent1"/>
+          </a:fillRef>
+          <a:effectRef idx="0">
+            <a:schemeClr val="accent1"/>
+          </a:effectRef>
+          <a:fontRef idx="minor">
+            <a:schemeClr val="lt1"/>
+          </a:fontRef>
+        </p:style>
+        <p:txBody>
+          <a:bodyPr rtlCol="0" anchor="ctr"/>
+          <a:lstStyle/>
+          <a:p>
+            <a:pPr algn="ctr"/>
+            <a:r>
+              <a:rPr kumimoji="1" lang="en-US" altLang="ja-JP" sz="1600" b="1" dirty="0">
+                <a:solidFill>
+                  <a:schemeClr val="tx1"/>
+                </a:solidFill>
+              </a:rPr>
+              <a:t>Random</a:t>
+            </a:r>
+          </a:p>
+          <a:p>
+            <a:pPr algn="ctr"/>
+            <a:r>
+              <a:rPr kumimoji="1" lang="en-US" altLang="ja-JP" sz="1600" b="1" dirty="0">
+                <a:solidFill>
+                  <a:schemeClr val="tx1"/>
+                </a:solidFill>
+              </a:rPr>
+              <a:t>Octet (Salt)</a:t>
+            </a:r>
+            <a:endParaRPr kumimoji="1" lang="ja-JP" altLang="en-US" sz="1600" b="1" dirty="0">
+              <a:solidFill>
+                <a:schemeClr val="tx1"/>
+              </a:solidFill>
+            </a:endParaRPr>
+          </a:p>
+        </p:txBody>
+      </p:sp>
+      <p:sp>
+        <p:nvSpPr>
+          <p:cNvPr id="81" name="右中かっこ 7">
+            <a:extLst>
+              <a:ext uri="{FF2B5EF4-FFF2-40B4-BE49-F238E27FC236}">
+                <a16:creationId xmlns:a16="http://schemas.microsoft.com/office/drawing/2014/main" id="{7705487C-35A0-FF4E-8704-9986A39965F7}"/>
+              </a:ext>
+            </a:extLst>
+          </p:cNvPr>
+          <p:cNvSpPr/>
+          <p:nvPr/>
+        </p:nvSpPr>
+        <p:spPr>
+          <a:xfrm rot="16200000">
+            <a:off x="2090701" y="1146286"/>
+            <a:ext cx="152848" cy="1049147"/>
+          </a:xfrm>
+          <a:prstGeom prst="rightBrace">
+            <a:avLst>
+              <a:gd name="adj1" fmla="val 57767"/>
+              <a:gd name="adj2" fmla="val 50000"/>
+            </a:avLst>
+          </a:prstGeom>
+          <a:ln w="19050">
+            <a:solidFill>
+              <a:schemeClr val="tx1"/>
+            </a:solidFill>
+          </a:ln>
+        </p:spPr>
+        <p:style>
+          <a:lnRef idx="1">
+            <a:schemeClr val="accent1"/>
+          </a:lnRef>
+          <a:fillRef idx="0">
+            <a:schemeClr val="accent1"/>
+          </a:fillRef>
+          <a:effectRef idx="0">
+            <a:schemeClr val="accent1"/>
+          </a:effectRef>
+          <a:fontRef idx="minor">
+            <a:schemeClr val="tx1"/>
+          </a:fontRef>
+        </p:style>
+        <p:txBody>
+          <a:bodyPr rtlCol="0" anchor="ctr"/>
+          <a:lstStyle/>
+          <a:p>
+            <a:pPr algn="ctr"/>
+            <a:endParaRPr kumimoji="1" lang="ja-JP" altLang="en-US" b="1"/>
+          </a:p>
+        </p:txBody>
+      </p:sp>
+      <p:sp>
+        <p:nvSpPr>
+          <p:cNvPr id="82" name="テキスト ボックス 9">
+            <a:extLst>
+              <a:ext uri="{FF2B5EF4-FFF2-40B4-BE49-F238E27FC236}">
+                <a16:creationId xmlns:a16="http://schemas.microsoft.com/office/drawing/2014/main" id="{93342270-DBE2-154C-88DF-A7B07AA4B0FE}"/>
+              </a:ext>
+            </a:extLst>
+          </p:cNvPr>
+          <p:cNvSpPr txBox="1"/>
+          <p:nvPr/>
+        </p:nvSpPr>
+        <p:spPr>
+          <a:xfrm>
+            <a:off x="1693568" y="1240902"/>
+            <a:ext cx="952825" cy="369332"/>
+          </a:xfrm>
+          <a:prstGeom prst="rect">
+            <a:avLst/>
+          </a:prstGeom>
+          <a:noFill/>
+        </p:spPr>
+        <p:txBody>
+          <a:bodyPr wrap="none" rtlCol="0">
+            <a:spAutoFit/>
+          </a:bodyPr>
+          <a:lstStyle/>
+          <a:p>
+            <a:r>
+              <a:rPr kumimoji="1" lang="en-US" altLang="ja-JP" b="1" dirty="0"/>
+              <a:t>Padding</a:t>
+            </a:r>
+            <a:endParaRPr kumimoji="1" lang="ja-JP" altLang="en-US" b="1" dirty="0"/>
+          </a:p>
+        </p:txBody>
+      </p:sp>
+      <p:cxnSp>
+        <p:nvCxnSpPr>
+          <p:cNvPr id="84" name="Straight Connector 83">
+            <a:extLst>
+              <a:ext uri="{FF2B5EF4-FFF2-40B4-BE49-F238E27FC236}">
+                <a16:creationId xmlns:a16="http://schemas.microsoft.com/office/drawing/2014/main" id="{FC52ECF9-50F6-5E41-9932-74A4330468C7}"/>
+              </a:ext>
+            </a:extLst>
+          </p:cNvPr>
+          <p:cNvCxnSpPr>
+            <a:cxnSpLocks/>
+          </p:cNvCxnSpPr>
+          <p:nvPr/>
+        </p:nvCxnSpPr>
+        <p:spPr>
+          <a:xfrm>
+            <a:off x="4128457" y="387275"/>
+            <a:ext cx="646197" cy="1597623"/>
+          </a:xfrm>
+          <a:prstGeom prst="line">
+            <a:avLst/>
+          </a:prstGeom>
+        </p:spPr>
+        <p:style>
+          <a:lnRef idx="1">
+            <a:schemeClr val="accent1"/>
+          </a:lnRef>
+          <a:fillRef idx="0">
+            <a:schemeClr val="accent1"/>
+          </a:fillRef>
+          <a:effectRef idx="0">
+            <a:schemeClr val="accent1"/>
+          </a:effectRef>
+          <a:fontRef idx="minor">
+            <a:schemeClr val="tx1"/>
+          </a:fontRef>
+        </p:style>
+      </p:cxnSp>
+      <p:sp>
+        <p:nvSpPr>
+          <p:cNvPr id="86" name="Line Callout 2 (Accent Bar) 85">
+            <a:extLst>
+              <a:ext uri="{FF2B5EF4-FFF2-40B4-BE49-F238E27FC236}">
+                <a16:creationId xmlns:a16="http://schemas.microsoft.com/office/drawing/2014/main" id="{AE9A9C40-97F7-6B47-BD39-644EE4B2F168}"/>
+              </a:ext>
+            </a:extLst>
+          </p:cNvPr>
+          <p:cNvSpPr/>
+          <p:nvPr/>
+        </p:nvSpPr>
+        <p:spPr>
+          <a:xfrm>
+            <a:off x="2850701" y="305205"/>
+            <a:ext cx="1354048" cy="437322"/>
+          </a:xfrm>
+          <a:prstGeom prst="accentCallout2">
+            <a:avLst>
+              <a:gd name="adj1" fmla="val 18750"/>
+              <a:gd name="adj2" fmla="val 94205"/>
+              <a:gd name="adj3" fmla="val 18750"/>
+              <a:gd name="adj4" fmla="val 103302"/>
+              <a:gd name="adj5" fmla="val 402768"/>
+              <a:gd name="adj6" fmla="val 433331"/>
+            </a:avLst>
+          </a:prstGeom>
+          <a:noFill/>
+        </p:spPr>
+        <p:style>
+          <a:lnRef idx="2">
+            <a:schemeClr val="accent1">
+              <a:shade val="50000"/>
+            </a:schemeClr>
+          </a:lnRef>
+          <a:fillRef idx="1">
+            <a:schemeClr val="accent1"/>
+          </a:fillRef>
+          <a:effectRef idx="0">
+            <a:schemeClr val="accent1"/>
+          </a:effectRef>
+          <a:fontRef idx="minor">
+            <a:schemeClr val="lt1"/>
+          </a:fontRef>
+        </p:style>
+        <p:txBody>
+          <a:bodyPr rtlCol="0" anchor="ctr"/>
+          <a:lstStyle/>
+          <a:p>
+            <a:pPr algn="ctr"/>
+            <a:r>
+              <a:rPr lang="en-US" dirty="0">
+                <a:solidFill>
+                  <a:schemeClr val="tx1"/>
+                </a:solidFill>
+              </a:rPr>
+              <a:t>Same Value</a:t>
+            </a:r>
+          </a:p>
+        </p:txBody>
+      </p:sp>
+    </p:spTree>
+    <p:extLst>
+      <p:ext uri="{BB962C8B-B14F-4D97-AF65-F5344CB8AC3E}">
+        <p14:creationId xmlns:p14="http://schemas.microsoft.com/office/powerpoint/2010/main" val="635363483"/>
+      </p:ext>
+    </p:extLst>
+  </p:cSld>
+  <p:clrMapOvr>
+    <a:masterClrMapping/>
+  </p:clrMapOvr>
+</p:sld>
+</file>
+
+<file path=ppt/slides/slide48.xml><?xml version="1.0" encoding="utf-8"?>
+<p:sld xmlns:a="http://schemas.openxmlformats.org/drawingml/2006/main" xmlns:r="http://schemas.openxmlformats.org/officeDocument/2006/relationships" xmlns:p="http://schemas.openxmlformats.org/presentationml/2006/main">
+  <p:cSld>
+    <p:spTree>
+      <p:nvGrpSpPr>
+        <p:cNvPr id="1" name=""/>
+        <p:cNvGrpSpPr/>
+        <p:nvPr/>
+      </p:nvGrpSpPr>
+      <p:grpSpPr>
+        <a:xfrm>
+          <a:off x="0" y="0"/>
+          <a:ext cx="0" cy="0"/>
+          <a:chOff x="0" y="0"/>
+          <a:chExt cx="0" cy="0"/>
+        </a:xfrm>
+      </p:grpSpPr>
+      <p:cxnSp>
+        <p:nvCxnSpPr>
+          <p:cNvPr id="4" name="Straight Arrow Connector 3">
+            <a:extLst>
+              <a:ext uri="{FF2B5EF4-FFF2-40B4-BE49-F238E27FC236}">
+                <a16:creationId xmlns:a16="http://schemas.microsoft.com/office/drawing/2014/main" id="{E4CC6717-3235-C747-8D27-142D5F6EEA9C}"/>
+              </a:ext>
+            </a:extLst>
+          </p:cNvPr>
+          <p:cNvCxnSpPr>
+            <a:cxnSpLocks/>
+          </p:cNvCxnSpPr>
+          <p:nvPr/>
+        </p:nvCxnSpPr>
+        <p:spPr>
+          <a:xfrm flipH="1">
+            <a:off x="2701803" y="817314"/>
+            <a:ext cx="38145" cy="5857806"/>
+          </a:xfrm>
+          <a:prstGeom prst="straightConnector1">
+            <a:avLst/>
+          </a:prstGeom>
+          <a:ln w="38100">
+            <a:solidFill>
+              <a:schemeClr val="tx1"/>
+            </a:solidFill>
+            <a:tailEnd type="triangle"/>
+          </a:ln>
+        </p:spPr>
+        <p:style>
+          <a:lnRef idx="1">
+            <a:schemeClr val="accent1"/>
+          </a:lnRef>
+          <a:fillRef idx="0">
+            <a:schemeClr val="accent1"/>
+          </a:fillRef>
+          <a:effectRef idx="0">
+            <a:schemeClr val="accent1"/>
+          </a:effectRef>
+          <a:fontRef idx="minor">
+            <a:schemeClr val="tx1"/>
+          </a:fontRef>
+        </p:style>
+      </p:cxnSp>
+      <p:cxnSp>
+        <p:nvCxnSpPr>
+          <p:cNvPr id="5" name="Straight Arrow Connector 4">
+            <a:extLst>
+              <a:ext uri="{FF2B5EF4-FFF2-40B4-BE49-F238E27FC236}">
+                <a16:creationId xmlns:a16="http://schemas.microsoft.com/office/drawing/2014/main" id="{CDCFDAEE-37B0-2045-A774-72D7B97D64CF}"/>
+              </a:ext>
+            </a:extLst>
+          </p:cNvPr>
+          <p:cNvCxnSpPr>
+            <a:cxnSpLocks/>
+            <a:stCxn id="13" idx="2"/>
+          </p:cNvCxnSpPr>
+          <p:nvPr/>
+        </p:nvCxnSpPr>
+        <p:spPr>
+          <a:xfrm>
+            <a:off x="8729866" y="983303"/>
+            <a:ext cx="42874" cy="5691817"/>
+          </a:xfrm>
+          <a:prstGeom prst="straightConnector1">
+            <a:avLst/>
+          </a:prstGeom>
+          <a:ln w="38100">
+            <a:solidFill>
+              <a:schemeClr val="tx1"/>
+            </a:solidFill>
+            <a:tailEnd type="triangle"/>
+          </a:ln>
+        </p:spPr>
+        <p:style>
+          <a:lnRef idx="1">
+            <a:schemeClr val="accent1"/>
+          </a:lnRef>
+          <a:fillRef idx="0">
+            <a:schemeClr val="accent1"/>
+          </a:fillRef>
+          <a:effectRef idx="0">
+            <a:schemeClr val="accent1"/>
+          </a:effectRef>
+          <a:fontRef idx="minor">
+            <a:schemeClr val="tx1"/>
+          </a:fontRef>
+        </p:style>
+      </p:cxnSp>
+      <p:pic>
+        <p:nvPicPr>
+          <p:cNvPr id="6" name="Picture 5">
+            <a:extLst>
+              <a:ext uri="{FF2B5EF4-FFF2-40B4-BE49-F238E27FC236}">
+                <a16:creationId xmlns:a16="http://schemas.microsoft.com/office/drawing/2014/main" id="{1EE5BCE4-8D0B-7648-84B9-837D0DA9DCB9}"/>
+              </a:ext>
+            </a:extLst>
+          </p:cNvPr>
+          <p:cNvPicPr>
+            <a:picLocks noChangeAspect="1"/>
+          </p:cNvPicPr>
+          <p:nvPr/>
+        </p:nvPicPr>
+        <p:blipFill>
+          <a:blip r:embed="rId2"/>
+          <a:stretch>
+            <a:fillRect/>
+          </a:stretch>
+        </p:blipFill>
+        <p:spPr>
+          <a:xfrm rot="13873712">
+            <a:off x="1322426" y="4632344"/>
+            <a:ext cx="545009" cy="272505"/>
+          </a:xfrm>
+          <a:prstGeom prst="rect">
+            <a:avLst/>
+          </a:prstGeom>
+        </p:spPr>
+      </p:pic>
+      <p:pic>
+        <p:nvPicPr>
+          <p:cNvPr id="7" name="Picture 6">
+            <a:extLst>
+              <a:ext uri="{FF2B5EF4-FFF2-40B4-BE49-F238E27FC236}">
+                <a16:creationId xmlns:a16="http://schemas.microsoft.com/office/drawing/2014/main" id="{2EB34C95-4BF0-8741-AAD0-1644DC2C8B2F}"/>
+              </a:ext>
+            </a:extLst>
+          </p:cNvPr>
+          <p:cNvPicPr>
+            <a:picLocks noChangeAspect="1"/>
+          </p:cNvPicPr>
+          <p:nvPr/>
+        </p:nvPicPr>
+        <p:blipFill>
+          <a:blip r:embed="rId3"/>
+          <a:stretch>
+            <a:fillRect/>
+          </a:stretch>
+        </p:blipFill>
+        <p:spPr>
+          <a:xfrm rot="19153627">
+            <a:off x="932047" y="4621389"/>
+            <a:ext cx="463927" cy="463927"/>
+          </a:xfrm>
+          <a:prstGeom prst="rect">
+            <a:avLst/>
+          </a:prstGeom>
+        </p:spPr>
+      </p:pic>
+      <p:pic>
+        <p:nvPicPr>
+          <p:cNvPr id="8" name="Picture 7">
+            <a:extLst>
+              <a:ext uri="{FF2B5EF4-FFF2-40B4-BE49-F238E27FC236}">
+                <a16:creationId xmlns:a16="http://schemas.microsoft.com/office/drawing/2014/main" id="{5D7E1DB8-DC1E-BA4D-9B6B-0D6D8F93D2B8}"/>
+              </a:ext>
+            </a:extLst>
+          </p:cNvPr>
+          <p:cNvPicPr>
+            <a:picLocks noChangeAspect="1"/>
+          </p:cNvPicPr>
+          <p:nvPr/>
+        </p:nvPicPr>
+        <p:blipFill>
+          <a:blip r:embed="rId4"/>
+          <a:stretch>
+            <a:fillRect/>
+          </a:stretch>
+        </p:blipFill>
+        <p:spPr>
+          <a:xfrm rot="2992708">
+            <a:off x="8059718" y="2168236"/>
+            <a:ext cx="153073" cy="484731"/>
+          </a:xfrm>
+          <a:prstGeom prst="rect">
+            <a:avLst/>
+          </a:prstGeom>
+        </p:spPr>
+      </p:pic>
+      <p:pic>
+        <p:nvPicPr>
+          <p:cNvPr id="9" name="Picture 8">
+            <a:extLst>
+              <a:ext uri="{FF2B5EF4-FFF2-40B4-BE49-F238E27FC236}">
+                <a16:creationId xmlns:a16="http://schemas.microsoft.com/office/drawing/2014/main" id="{72451EC5-3325-5C4F-889D-41ED49F98B7F}"/>
+              </a:ext>
+            </a:extLst>
+          </p:cNvPr>
+          <p:cNvPicPr>
+            <a:picLocks noChangeAspect="1"/>
+          </p:cNvPicPr>
+          <p:nvPr/>
+        </p:nvPicPr>
+        <p:blipFill>
+          <a:blip r:embed="rId5"/>
+          <a:stretch>
+            <a:fillRect/>
+          </a:stretch>
+        </p:blipFill>
+        <p:spPr>
+          <a:xfrm>
+            <a:off x="3273334" y="2363350"/>
+            <a:ext cx="353858" cy="357348"/>
+          </a:xfrm>
+          <a:prstGeom prst="rect">
+            <a:avLst/>
+          </a:prstGeom>
+        </p:spPr>
+      </p:pic>
+      <p:sp>
+        <p:nvSpPr>
+          <p:cNvPr id="10" name="TextBox 9">
+            <a:extLst>
+              <a:ext uri="{FF2B5EF4-FFF2-40B4-BE49-F238E27FC236}">
+                <a16:creationId xmlns:a16="http://schemas.microsoft.com/office/drawing/2014/main" id="{467D7215-B6D7-E141-8B6B-2718F44F8392}"/>
+              </a:ext>
+            </a:extLst>
+          </p:cNvPr>
+          <p:cNvSpPr txBox="1"/>
+          <p:nvPr/>
+        </p:nvSpPr>
+        <p:spPr>
+          <a:xfrm>
+            <a:off x="2869752" y="2011226"/>
+            <a:ext cx="1161022" cy="369332"/>
+          </a:xfrm>
+          <a:prstGeom prst="rect">
+            <a:avLst/>
+          </a:prstGeom>
+          <a:noFill/>
+        </p:spPr>
+        <p:txBody>
+          <a:bodyPr wrap="none" rtlCol="0">
+            <a:spAutoFit/>
+          </a:bodyPr>
+          <a:lstStyle/>
+          <a:p>
+            <a:pPr algn="ctr"/>
+            <a:r>
+              <a:rPr lang="en-US" b="1" dirty="0"/>
+              <a:t>Public Key</a:t>
+            </a:r>
+          </a:p>
+        </p:txBody>
+      </p:sp>
+      <p:pic>
+        <p:nvPicPr>
+          <p:cNvPr id="12" name="Picture 11">
+            <a:extLst>
+              <a:ext uri="{FF2B5EF4-FFF2-40B4-BE49-F238E27FC236}">
+                <a16:creationId xmlns:a16="http://schemas.microsoft.com/office/drawing/2014/main" id="{05322E09-A3D8-404A-897E-28A5DC08C10E}"/>
+              </a:ext>
+            </a:extLst>
+          </p:cNvPr>
+          <p:cNvPicPr>
+            <a:picLocks noChangeAspect="1"/>
+          </p:cNvPicPr>
+          <p:nvPr/>
+        </p:nvPicPr>
+        <p:blipFill>
+          <a:blip r:embed="rId6"/>
+          <a:stretch>
+            <a:fillRect/>
+          </a:stretch>
+        </p:blipFill>
+        <p:spPr>
+          <a:xfrm>
+            <a:off x="2217065" y="169129"/>
+            <a:ext cx="969476" cy="648185"/>
+          </a:xfrm>
+          <a:prstGeom prst="rect">
+            <a:avLst/>
+          </a:prstGeom>
+        </p:spPr>
+      </p:pic>
+      <p:pic>
+        <p:nvPicPr>
+          <p:cNvPr id="13" name="Picture 12">
+            <a:extLst>
+              <a:ext uri="{FF2B5EF4-FFF2-40B4-BE49-F238E27FC236}">
+                <a16:creationId xmlns:a16="http://schemas.microsoft.com/office/drawing/2014/main" id="{BC4DADED-93AD-A14F-B251-64787C02F9E9}"/>
+              </a:ext>
+            </a:extLst>
+          </p:cNvPr>
+          <p:cNvPicPr>
+            <a:picLocks noChangeAspect="1"/>
+          </p:cNvPicPr>
+          <p:nvPr/>
+        </p:nvPicPr>
+        <p:blipFill>
+          <a:blip r:embed="rId7"/>
+          <a:stretch>
+            <a:fillRect/>
+          </a:stretch>
+        </p:blipFill>
+        <p:spPr>
+          <a:xfrm>
+            <a:off x="8386693" y="0"/>
+            <a:ext cx="686346" cy="983303"/>
+          </a:xfrm>
+          <a:prstGeom prst="rect">
+            <a:avLst/>
+          </a:prstGeom>
+        </p:spPr>
+      </p:pic>
+      <p:sp>
+        <p:nvSpPr>
+          <p:cNvPr id="15" name="四角形: 角を丸くする 4">
+            <a:extLst>
+              <a:ext uri="{FF2B5EF4-FFF2-40B4-BE49-F238E27FC236}">
+                <a16:creationId xmlns:a16="http://schemas.microsoft.com/office/drawing/2014/main" id="{813441B2-ED5C-D744-BF10-E3E688173C8B}"/>
+              </a:ext>
+            </a:extLst>
+          </p:cNvPr>
+          <p:cNvSpPr/>
+          <p:nvPr/>
+        </p:nvSpPr>
+        <p:spPr>
+          <a:xfrm>
+            <a:off x="7673502" y="1045643"/>
+            <a:ext cx="2112728" cy="824718"/>
+          </a:xfrm>
+          <a:prstGeom prst="roundRect">
+            <a:avLst/>
+          </a:prstGeom>
+          <a:solidFill>
+            <a:schemeClr val="bg1"/>
+          </a:solidFill>
+          <a:ln w="38100"/>
+        </p:spPr>
+        <p:style>
+          <a:lnRef idx="2">
+            <a:schemeClr val="accent1"/>
+          </a:lnRef>
+          <a:fillRef idx="1">
+            <a:schemeClr val="lt1"/>
+          </a:fillRef>
+          <a:effectRef idx="0">
+            <a:schemeClr val="accent1"/>
+          </a:effectRef>
+          <a:fontRef idx="minor">
+            <a:schemeClr val="dk1"/>
+          </a:fontRef>
+        </p:style>
+        <p:txBody>
+          <a:bodyPr rtlCol="0" anchor="ctr"/>
+          <a:lstStyle/>
+          <a:p>
+            <a:pPr algn="ctr"/>
+            <a:r>
+              <a:rPr kumimoji="1" lang="en-US" altLang="ja-JP" b="1" dirty="0">
+                <a:solidFill>
+                  <a:srgbClr val="7030A0"/>
+                </a:solidFill>
+              </a:rPr>
+              <a:t>1) Generate Key Pair for Encryption</a:t>
+            </a:r>
+          </a:p>
+        </p:txBody>
+      </p:sp>
+      <p:sp>
+        <p:nvSpPr>
+          <p:cNvPr id="16" name="TextBox 15">
+            <a:extLst>
+              <a:ext uri="{FF2B5EF4-FFF2-40B4-BE49-F238E27FC236}">
+                <a16:creationId xmlns:a16="http://schemas.microsoft.com/office/drawing/2014/main" id="{DCD56E07-E580-5044-8CB1-D71679D9F995}"/>
+              </a:ext>
+            </a:extLst>
+          </p:cNvPr>
+          <p:cNvSpPr txBox="1"/>
+          <p:nvPr/>
+        </p:nvSpPr>
+        <p:spPr>
+          <a:xfrm>
+            <a:off x="7648262" y="1892409"/>
+            <a:ext cx="1161022" cy="369332"/>
+          </a:xfrm>
+          <a:prstGeom prst="rect">
+            <a:avLst/>
+          </a:prstGeom>
+          <a:noFill/>
+        </p:spPr>
+        <p:txBody>
+          <a:bodyPr wrap="none" rtlCol="0">
+            <a:spAutoFit/>
+          </a:bodyPr>
+          <a:lstStyle/>
+          <a:p>
+            <a:pPr algn="ctr"/>
+            <a:r>
+              <a:rPr lang="en-US" b="1" dirty="0"/>
+              <a:t>Public Key</a:t>
+            </a:r>
+          </a:p>
+        </p:txBody>
+      </p:sp>
+      <p:cxnSp>
+        <p:nvCxnSpPr>
+          <p:cNvPr id="18" name="Straight Arrow Connector 17">
+            <a:extLst>
+              <a:ext uri="{FF2B5EF4-FFF2-40B4-BE49-F238E27FC236}">
+                <a16:creationId xmlns:a16="http://schemas.microsoft.com/office/drawing/2014/main" id="{6AE161CE-712D-824C-BBE3-9F14F987B5A0}"/>
+              </a:ext>
+            </a:extLst>
+          </p:cNvPr>
+          <p:cNvCxnSpPr>
+            <a:cxnSpLocks/>
+            <a:stCxn id="9" idx="3"/>
+          </p:cNvCxnSpPr>
+          <p:nvPr/>
+        </p:nvCxnSpPr>
+        <p:spPr>
+          <a:xfrm>
+            <a:off x="3627192" y="2542024"/>
+            <a:ext cx="4374517" cy="535307"/>
+          </a:xfrm>
+          <a:prstGeom prst="straightConnector1">
+            <a:avLst/>
+          </a:prstGeom>
+          <a:ln w="38100">
+            <a:tailEnd type="triangle"/>
+          </a:ln>
+        </p:spPr>
+        <p:style>
+          <a:lnRef idx="1">
+            <a:schemeClr val="accent1"/>
+          </a:lnRef>
+          <a:fillRef idx="0">
+            <a:schemeClr val="accent1"/>
+          </a:fillRef>
+          <a:effectRef idx="0">
+            <a:schemeClr val="accent1"/>
+          </a:effectRef>
+          <a:fontRef idx="minor">
+            <a:schemeClr val="tx1"/>
+          </a:fontRef>
+        </p:style>
+      </p:cxnSp>
+      <p:cxnSp>
+        <p:nvCxnSpPr>
+          <p:cNvPr id="19" name="Straight Arrow Connector 18">
+            <a:extLst>
+              <a:ext uri="{FF2B5EF4-FFF2-40B4-BE49-F238E27FC236}">
+                <a16:creationId xmlns:a16="http://schemas.microsoft.com/office/drawing/2014/main" id="{54FEF7CF-C67D-4A42-89C9-55B43A51C941}"/>
+              </a:ext>
+            </a:extLst>
+          </p:cNvPr>
+          <p:cNvCxnSpPr>
+            <a:cxnSpLocks/>
+          </p:cNvCxnSpPr>
+          <p:nvPr/>
+        </p:nvCxnSpPr>
+        <p:spPr>
+          <a:xfrm flipH="1">
+            <a:off x="3507988" y="2435762"/>
+            <a:ext cx="4393613" cy="678658"/>
+          </a:xfrm>
+          <a:prstGeom prst="straightConnector1">
+            <a:avLst/>
+          </a:prstGeom>
+          <a:ln w="38100">
+            <a:tailEnd type="triangle"/>
+          </a:ln>
+        </p:spPr>
+        <p:style>
+          <a:lnRef idx="1">
+            <a:schemeClr val="accent1"/>
+          </a:lnRef>
+          <a:fillRef idx="0">
+            <a:schemeClr val="accent1"/>
+          </a:fillRef>
+          <a:effectRef idx="0">
+            <a:schemeClr val="accent1"/>
+          </a:effectRef>
+          <a:fontRef idx="minor">
+            <a:schemeClr val="tx1"/>
+          </a:fontRef>
+        </p:style>
+      </p:cxnSp>
+      <p:pic>
+        <p:nvPicPr>
+          <p:cNvPr id="20" name="Picture 19">
+            <a:extLst>
+              <a:ext uri="{FF2B5EF4-FFF2-40B4-BE49-F238E27FC236}">
+                <a16:creationId xmlns:a16="http://schemas.microsoft.com/office/drawing/2014/main" id="{AFE1790D-3DC1-8A45-9220-20470F67BE2F}"/>
+              </a:ext>
+            </a:extLst>
+          </p:cNvPr>
+          <p:cNvPicPr>
+            <a:picLocks noChangeAspect="1"/>
+          </p:cNvPicPr>
+          <p:nvPr/>
+        </p:nvPicPr>
+        <p:blipFill>
+          <a:blip r:embed="rId4"/>
+          <a:stretch>
+            <a:fillRect/>
+          </a:stretch>
+        </p:blipFill>
+        <p:spPr>
+          <a:xfrm rot="2992708">
+            <a:off x="3296554" y="2896465"/>
+            <a:ext cx="153073" cy="484731"/>
+          </a:xfrm>
+          <a:prstGeom prst="rect">
+            <a:avLst/>
+          </a:prstGeom>
+        </p:spPr>
+      </p:pic>
+      <p:pic>
+        <p:nvPicPr>
+          <p:cNvPr id="21" name="Picture 20">
+            <a:extLst>
+              <a:ext uri="{FF2B5EF4-FFF2-40B4-BE49-F238E27FC236}">
+                <a16:creationId xmlns:a16="http://schemas.microsoft.com/office/drawing/2014/main" id="{9E3A6481-D962-C848-BFDA-1E4D57C9BBA3}"/>
+              </a:ext>
+            </a:extLst>
+          </p:cNvPr>
+          <p:cNvPicPr>
+            <a:picLocks noChangeAspect="1"/>
+          </p:cNvPicPr>
+          <p:nvPr/>
+        </p:nvPicPr>
+        <p:blipFill>
+          <a:blip r:embed="rId5"/>
+          <a:stretch>
+            <a:fillRect/>
+          </a:stretch>
+        </p:blipFill>
+        <p:spPr>
+          <a:xfrm>
+            <a:off x="8001709" y="3077331"/>
+            <a:ext cx="353858" cy="357348"/>
+          </a:xfrm>
+          <a:prstGeom prst="rect">
+            <a:avLst/>
+          </a:prstGeom>
+        </p:spPr>
+      </p:pic>
+      <p:sp>
+        <p:nvSpPr>
+          <p:cNvPr id="23" name="四角形: 角を丸くする 4">
+            <a:extLst>
+              <a:ext uri="{FF2B5EF4-FFF2-40B4-BE49-F238E27FC236}">
+                <a16:creationId xmlns:a16="http://schemas.microsoft.com/office/drawing/2014/main" id="{BF69FFF3-DF52-6445-9EE2-183AF29B10DF}"/>
+              </a:ext>
+            </a:extLst>
+          </p:cNvPr>
+          <p:cNvSpPr/>
+          <p:nvPr/>
+        </p:nvSpPr>
+        <p:spPr>
+          <a:xfrm>
+            <a:off x="4652367" y="2363350"/>
+            <a:ext cx="2228572" cy="824718"/>
+          </a:xfrm>
+          <a:prstGeom prst="roundRect">
+            <a:avLst/>
+          </a:prstGeom>
+          <a:solidFill>
+            <a:schemeClr val="bg1"/>
+          </a:solidFill>
+          <a:ln w="38100"/>
+        </p:spPr>
+        <p:style>
+          <a:lnRef idx="2">
+            <a:schemeClr val="accent1"/>
+          </a:lnRef>
+          <a:fillRef idx="1">
+            <a:schemeClr val="lt1"/>
+          </a:fillRef>
+          <a:effectRef idx="0">
+            <a:schemeClr val="accent1"/>
+          </a:effectRef>
+          <a:fontRef idx="minor">
+            <a:schemeClr val="dk1"/>
+          </a:fontRef>
+        </p:style>
+        <p:txBody>
+          <a:bodyPr rtlCol="0" anchor="ctr"/>
+          <a:lstStyle/>
+          <a:p>
+            <a:pPr algn="ctr"/>
+            <a:r>
+              <a:rPr kumimoji="1" lang="en-US" altLang="ja-JP" b="1" dirty="0"/>
+              <a:t>2) Exchange </a:t>
+            </a:r>
+            <a:r>
+              <a:rPr kumimoji="1" lang="en-US" altLang="ja-JP" b="1" dirty="0">
+                <a:solidFill>
+                  <a:srgbClr val="0070C0"/>
+                </a:solidFill>
+              </a:rPr>
+              <a:t>Public Key with Signature</a:t>
+            </a:r>
+          </a:p>
+        </p:txBody>
+      </p:sp>
+      <p:sp>
+        <p:nvSpPr>
+          <p:cNvPr id="28" name="四角形: 角を丸くする 4">
+            <a:extLst>
+              <a:ext uri="{FF2B5EF4-FFF2-40B4-BE49-F238E27FC236}">
+                <a16:creationId xmlns:a16="http://schemas.microsoft.com/office/drawing/2014/main" id="{31114E97-3E7A-E74E-8152-B986A3DD78F3}"/>
+              </a:ext>
+            </a:extLst>
+          </p:cNvPr>
+          <p:cNvSpPr/>
+          <p:nvPr/>
+        </p:nvSpPr>
+        <p:spPr>
+          <a:xfrm>
+            <a:off x="8070009" y="3457758"/>
+            <a:ext cx="2375666" cy="824718"/>
+          </a:xfrm>
+          <a:prstGeom prst="roundRect">
+            <a:avLst/>
+          </a:prstGeom>
+          <a:solidFill>
+            <a:schemeClr val="accent6">
+              <a:lumMod val="20000"/>
+              <a:lumOff val="80000"/>
+            </a:schemeClr>
+          </a:solidFill>
+          <a:ln w="38100"/>
+        </p:spPr>
+        <p:style>
+          <a:lnRef idx="2">
+            <a:schemeClr val="accent1"/>
+          </a:lnRef>
+          <a:fillRef idx="1">
+            <a:schemeClr val="lt1"/>
+          </a:fillRef>
+          <a:effectRef idx="0">
+            <a:schemeClr val="accent1"/>
+          </a:effectRef>
+          <a:fontRef idx="minor">
+            <a:schemeClr val="dk1"/>
+          </a:fontRef>
+        </p:style>
+        <p:txBody>
+          <a:bodyPr rtlCol="0" anchor="ctr"/>
+          <a:lstStyle/>
+          <a:p>
+            <a:pPr algn="ctr"/>
+            <a:r>
+              <a:rPr kumimoji="1" lang="en-US" altLang="ja-JP" b="1" dirty="0">
+                <a:solidFill>
+                  <a:schemeClr val="tx1"/>
+                </a:solidFill>
+              </a:rPr>
+              <a:t>2) </a:t>
+            </a:r>
+            <a:r>
+              <a:rPr kumimoji="1" lang="en-US" altLang="ja-JP" b="1" dirty="0">
+                <a:solidFill>
+                  <a:srgbClr val="0070C0"/>
+                </a:solidFill>
+              </a:rPr>
+              <a:t>Verify Signature </a:t>
+            </a:r>
+            <a:r>
+              <a:rPr kumimoji="1" lang="en-US" altLang="ja-JP" b="1" dirty="0">
+                <a:solidFill>
+                  <a:schemeClr val="tx1"/>
+                </a:solidFill>
+              </a:rPr>
+              <a:t>of the Public key!</a:t>
+            </a:r>
+          </a:p>
+        </p:txBody>
+      </p:sp>
+      <p:sp>
+        <p:nvSpPr>
+          <p:cNvPr id="30" name="四角形: 角を丸くする 4">
+            <a:extLst>
+              <a:ext uri="{FF2B5EF4-FFF2-40B4-BE49-F238E27FC236}">
+                <a16:creationId xmlns:a16="http://schemas.microsoft.com/office/drawing/2014/main" id="{A38D926C-3891-9844-A74B-1AC9C012E300}"/>
+              </a:ext>
+            </a:extLst>
+          </p:cNvPr>
+          <p:cNvSpPr/>
+          <p:nvPr/>
+        </p:nvSpPr>
+        <p:spPr>
+          <a:xfrm>
+            <a:off x="1949301" y="4518302"/>
+            <a:ext cx="7533170" cy="463927"/>
+          </a:xfrm>
+          <a:prstGeom prst="roundRect">
+            <a:avLst/>
+          </a:prstGeom>
+          <a:solidFill>
+            <a:schemeClr val="accent4">
+              <a:lumMod val="20000"/>
+              <a:lumOff val="80000"/>
+            </a:schemeClr>
+          </a:solidFill>
+          <a:ln w="38100"/>
+        </p:spPr>
+        <p:style>
+          <a:lnRef idx="2">
+            <a:schemeClr val="accent1"/>
+          </a:lnRef>
+          <a:fillRef idx="1">
+            <a:schemeClr val="lt1"/>
+          </a:fillRef>
+          <a:effectRef idx="0">
+            <a:schemeClr val="accent1"/>
+          </a:effectRef>
+          <a:fontRef idx="minor">
+            <a:schemeClr val="dk1"/>
+          </a:fontRef>
+        </p:style>
+        <p:txBody>
+          <a:bodyPr rtlCol="0" anchor="ctr"/>
+          <a:lstStyle/>
+          <a:p>
+            <a:pPr algn="ctr"/>
+            <a:r>
+              <a:rPr kumimoji="1" lang="en-US" altLang="ja-JP" b="1" dirty="0">
+                <a:solidFill>
+                  <a:schemeClr val="tx1"/>
+                </a:solidFill>
+              </a:rPr>
+              <a:t>3) </a:t>
+            </a:r>
+            <a:r>
+              <a:rPr kumimoji="1" lang="en-US" altLang="ja-JP" b="1" dirty="0">
+                <a:solidFill>
+                  <a:srgbClr val="FF0000"/>
+                </a:solidFill>
+              </a:rPr>
+              <a:t>Sharing AES/HMAC Key </a:t>
+            </a:r>
+            <a:r>
+              <a:rPr kumimoji="1" lang="en-US" altLang="ja-JP" b="1" dirty="0">
+                <a:solidFill>
+                  <a:schemeClr val="tx1"/>
+                </a:solidFill>
+              </a:rPr>
+              <a:t>using Public Key Encryption (e.g., ECDH+AES)</a:t>
+            </a:r>
+          </a:p>
+        </p:txBody>
+      </p:sp>
+      <p:cxnSp>
+        <p:nvCxnSpPr>
+          <p:cNvPr id="37" name="Straight Arrow Connector 36">
+            <a:extLst>
+              <a:ext uri="{FF2B5EF4-FFF2-40B4-BE49-F238E27FC236}">
+                <a16:creationId xmlns:a16="http://schemas.microsoft.com/office/drawing/2014/main" id="{2E7EB157-666F-3F44-8898-788807B78213}"/>
+              </a:ext>
+            </a:extLst>
+          </p:cNvPr>
+          <p:cNvCxnSpPr>
+            <a:cxnSpLocks/>
+          </p:cNvCxnSpPr>
+          <p:nvPr/>
+        </p:nvCxnSpPr>
+        <p:spPr>
+          <a:xfrm>
+            <a:off x="2720875" y="5965532"/>
+            <a:ext cx="6051865" cy="0"/>
+          </a:xfrm>
+          <a:prstGeom prst="straightConnector1">
+            <a:avLst/>
+          </a:prstGeom>
+          <a:ln w="38100">
+            <a:headEnd type="triangle" w="med" len="med"/>
+            <a:tailEnd type="triangle" w="med" len="med"/>
+          </a:ln>
+        </p:spPr>
+        <p:style>
+          <a:lnRef idx="1">
+            <a:schemeClr val="accent1"/>
+          </a:lnRef>
+          <a:fillRef idx="0">
+            <a:schemeClr val="accent1"/>
+          </a:fillRef>
+          <a:effectRef idx="0">
+            <a:schemeClr val="accent1"/>
+          </a:effectRef>
+          <a:fontRef idx="minor">
+            <a:schemeClr val="tx1"/>
+          </a:fontRef>
+        </p:style>
+      </p:cxnSp>
+      <p:sp>
+        <p:nvSpPr>
+          <p:cNvPr id="36" name="四角形: 角を丸くする 4">
+            <a:extLst>
+              <a:ext uri="{FF2B5EF4-FFF2-40B4-BE49-F238E27FC236}">
+                <a16:creationId xmlns:a16="http://schemas.microsoft.com/office/drawing/2014/main" id="{64F121F6-EE46-8D4C-A510-F9CA3D742180}"/>
+              </a:ext>
+            </a:extLst>
+          </p:cNvPr>
+          <p:cNvSpPr/>
+          <p:nvPr/>
+        </p:nvSpPr>
+        <p:spPr>
+          <a:xfrm>
+            <a:off x="3913515" y="5561393"/>
+            <a:ext cx="3499675" cy="824718"/>
+          </a:xfrm>
+          <a:prstGeom prst="roundRect">
+            <a:avLst/>
+          </a:prstGeom>
+          <a:solidFill>
+            <a:schemeClr val="accent2">
+              <a:lumMod val="20000"/>
+              <a:lumOff val="80000"/>
+            </a:schemeClr>
+          </a:solidFill>
+          <a:ln w="38100"/>
+        </p:spPr>
+        <p:style>
+          <a:lnRef idx="2">
+            <a:schemeClr val="accent1"/>
+          </a:lnRef>
+          <a:fillRef idx="1">
+            <a:schemeClr val="lt1"/>
+          </a:fillRef>
+          <a:effectRef idx="0">
+            <a:schemeClr val="accent1"/>
+          </a:effectRef>
+          <a:fontRef idx="minor">
+            <a:schemeClr val="dk1"/>
+          </a:fontRef>
+        </p:style>
+        <p:txBody>
+          <a:bodyPr rtlCol="0" anchor="ctr"/>
+          <a:lstStyle/>
+          <a:p>
+            <a:pPr algn="ctr"/>
+            <a:r>
+              <a:rPr kumimoji="1" lang="en-US" altLang="ja-JP" b="1" dirty="0"/>
+              <a:t>4) Send AES-Encrypted Data with </a:t>
+            </a:r>
+            <a:r>
+              <a:rPr kumimoji="1" lang="en-US" altLang="ja-JP" b="1" dirty="0">
+                <a:solidFill>
+                  <a:srgbClr val="FF0000"/>
+                </a:solidFill>
+              </a:rPr>
+              <a:t>HMAC </a:t>
+            </a:r>
+          </a:p>
+        </p:txBody>
+      </p:sp>
+      <p:sp>
+        <p:nvSpPr>
+          <p:cNvPr id="42" name="四角形: 角を丸くする 4">
+            <a:extLst>
+              <a:ext uri="{FF2B5EF4-FFF2-40B4-BE49-F238E27FC236}">
+                <a16:creationId xmlns:a16="http://schemas.microsoft.com/office/drawing/2014/main" id="{54F66F1B-F123-4E4A-A19B-8DD0EBBECB97}"/>
+              </a:ext>
+            </a:extLst>
+          </p:cNvPr>
+          <p:cNvSpPr/>
+          <p:nvPr/>
+        </p:nvSpPr>
+        <p:spPr>
+          <a:xfrm>
+            <a:off x="8943171" y="5568740"/>
+            <a:ext cx="2072816" cy="824718"/>
+          </a:xfrm>
+          <a:prstGeom prst="roundRect">
+            <a:avLst/>
+          </a:prstGeom>
+          <a:solidFill>
+            <a:schemeClr val="accent2">
+              <a:lumMod val="20000"/>
+              <a:lumOff val="80000"/>
+            </a:schemeClr>
+          </a:solidFill>
+          <a:ln w="38100"/>
+        </p:spPr>
+        <p:style>
+          <a:lnRef idx="2">
+            <a:schemeClr val="accent1"/>
+          </a:lnRef>
+          <a:fillRef idx="1">
+            <a:schemeClr val="lt1"/>
+          </a:fillRef>
+          <a:effectRef idx="0">
+            <a:schemeClr val="accent1"/>
+          </a:effectRef>
+          <a:fontRef idx="minor">
+            <a:schemeClr val="dk1"/>
+          </a:fontRef>
+        </p:style>
+        <p:txBody>
+          <a:bodyPr rtlCol="0" anchor="ctr"/>
+          <a:lstStyle/>
+          <a:p>
+            <a:pPr algn="ctr"/>
+            <a:r>
+              <a:rPr kumimoji="1" lang="en-US" altLang="ja-JP" b="1" dirty="0">
+                <a:solidFill>
+                  <a:schemeClr val="tx1"/>
+                </a:solidFill>
+              </a:rPr>
+              <a:t>5) AES-Decrypt and Check </a:t>
+            </a:r>
+            <a:r>
+              <a:rPr kumimoji="1" lang="en-US" altLang="ja-JP" b="1" dirty="0">
+                <a:solidFill>
+                  <a:srgbClr val="FF0000"/>
+                </a:solidFill>
+              </a:rPr>
+              <a:t>HMAC</a:t>
+            </a:r>
+            <a:r>
+              <a:rPr kumimoji="1" lang="en-US" altLang="ja-JP" b="1" dirty="0">
+                <a:solidFill>
+                  <a:schemeClr val="tx1"/>
+                </a:solidFill>
+              </a:rPr>
+              <a:t>!</a:t>
+            </a:r>
+          </a:p>
+        </p:txBody>
+      </p:sp>
+      <p:pic>
+        <p:nvPicPr>
+          <p:cNvPr id="43" name="Picture 60">
+            <a:extLst>
+              <a:ext uri="{FF2B5EF4-FFF2-40B4-BE49-F238E27FC236}">
+                <a16:creationId xmlns:a16="http://schemas.microsoft.com/office/drawing/2014/main" id="{F24EFFE5-3760-904C-B05D-D27666621FFB}"/>
+              </a:ext>
+            </a:extLst>
+          </p:cNvPr>
+          <p:cNvPicPr>
+            <a:picLocks noChangeAspect="1"/>
+          </p:cNvPicPr>
+          <p:nvPr/>
+        </p:nvPicPr>
+        <p:blipFill>
+          <a:blip r:embed="rId8"/>
+          <a:stretch>
+            <a:fillRect/>
+          </a:stretch>
+        </p:blipFill>
+        <p:spPr>
+          <a:xfrm>
+            <a:off x="7988404" y="5277721"/>
+            <a:ext cx="598353" cy="636105"/>
+          </a:xfrm>
+          <a:prstGeom prst="rect">
+            <a:avLst/>
+          </a:prstGeom>
+        </p:spPr>
+      </p:pic>
+      <p:pic>
+        <p:nvPicPr>
+          <p:cNvPr id="46" name="Picture 45">
+            <a:extLst>
+              <a:ext uri="{FF2B5EF4-FFF2-40B4-BE49-F238E27FC236}">
+                <a16:creationId xmlns:a16="http://schemas.microsoft.com/office/drawing/2014/main" id="{8AA2356F-E40E-714F-A1F2-AF1013ED7AB4}"/>
+              </a:ext>
+            </a:extLst>
+          </p:cNvPr>
+          <p:cNvPicPr>
+            <a:picLocks noChangeAspect="1"/>
+          </p:cNvPicPr>
+          <p:nvPr/>
+        </p:nvPicPr>
+        <p:blipFill>
+          <a:blip r:embed="rId2"/>
+          <a:stretch>
+            <a:fillRect/>
+          </a:stretch>
+        </p:blipFill>
+        <p:spPr>
+          <a:xfrm rot="13873712">
+            <a:off x="10050256" y="4548195"/>
+            <a:ext cx="545009" cy="272505"/>
+          </a:xfrm>
+          <a:prstGeom prst="rect">
+            <a:avLst/>
+          </a:prstGeom>
+        </p:spPr>
+      </p:pic>
+      <p:pic>
+        <p:nvPicPr>
+          <p:cNvPr id="47" name="Picture 46">
+            <a:extLst>
+              <a:ext uri="{FF2B5EF4-FFF2-40B4-BE49-F238E27FC236}">
+                <a16:creationId xmlns:a16="http://schemas.microsoft.com/office/drawing/2014/main" id="{B38D378B-3DC2-A340-A567-7600AB34A387}"/>
+              </a:ext>
+            </a:extLst>
+          </p:cNvPr>
+          <p:cNvPicPr>
+            <a:picLocks noChangeAspect="1"/>
+          </p:cNvPicPr>
+          <p:nvPr/>
+        </p:nvPicPr>
+        <p:blipFill>
+          <a:blip r:embed="rId3"/>
+          <a:stretch>
+            <a:fillRect/>
+          </a:stretch>
+        </p:blipFill>
+        <p:spPr>
+          <a:xfrm rot="19153627">
+            <a:off x="9659877" y="4537240"/>
+            <a:ext cx="463927" cy="463927"/>
+          </a:xfrm>
+          <a:prstGeom prst="rect">
+            <a:avLst/>
+          </a:prstGeom>
+        </p:spPr>
+      </p:pic>
+      <p:sp>
+        <p:nvSpPr>
+          <p:cNvPr id="48" name="四角形: 角を丸くする 4">
+            <a:extLst>
+              <a:ext uri="{FF2B5EF4-FFF2-40B4-BE49-F238E27FC236}">
+                <a16:creationId xmlns:a16="http://schemas.microsoft.com/office/drawing/2014/main" id="{1B234B58-D120-5947-8975-AD1EBF596D12}"/>
+              </a:ext>
+            </a:extLst>
+          </p:cNvPr>
+          <p:cNvSpPr/>
+          <p:nvPr/>
+        </p:nvSpPr>
+        <p:spPr>
+          <a:xfrm>
+            <a:off x="1552115" y="3491515"/>
+            <a:ext cx="2375666" cy="824718"/>
+          </a:xfrm>
+          <a:prstGeom prst="roundRect">
+            <a:avLst/>
+          </a:prstGeom>
+          <a:solidFill>
+            <a:schemeClr val="accent6">
+              <a:lumMod val="20000"/>
+              <a:lumOff val="80000"/>
+            </a:schemeClr>
+          </a:solidFill>
+          <a:ln w="38100"/>
+        </p:spPr>
+        <p:style>
+          <a:lnRef idx="2">
+            <a:schemeClr val="accent1"/>
+          </a:lnRef>
+          <a:fillRef idx="1">
+            <a:schemeClr val="lt1"/>
+          </a:fillRef>
+          <a:effectRef idx="0">
+            <a:schemeClr val="accent1"/>
+          </a:effectRef>
+          <a:fontRef idx="minor">
+            <a:schemeClr val="dk1"/>
+          </a:fontRef>
+        </p:style>
+        <p:txBody>
+          <a:bodyPr rtlCol="0" anchor="ctr"/>
+          <a:lstStyle/>
+          <a:p>
+            <a:pPr algn="ctr"/>
+            <a:r>
+              <a:rPr kumimoji="1" lang="en-US" altLang="ja-JP" b="1" dirty="0">
+                <a:solidFill>
+                  <a:schemeClr val="tx1"/>
+                </a:solidFill>
+              </a:rPr>
+              <a:t>2) </a:t>
+            </a:r>
+            <a:r>
+              <a:rPr kumimoji="1" lang="en-US" altLang="ja-JP" b="1" dirty="0">
+                <a:solidFill>
+                  <a:srgbClr val="0070C0"/>
+                </a:solidFill>
+              </a:rPr>
+              <a:t>Verify Signature </a:t>
+            </a:r>
+            <a:r>
+              <a:rPr kumimoji="1" lang="en-US" altLang="ja-JP" b="1" dirty="0">
+                <a:solidFill>
+                  <a:schemeClr val="tx1"/>
+                </a:solidFill>
+              </a:rPr>
+              <a:t>of the Public key!</a:t>
+            </a:r>
+          </a:p>
+        </p:txBody>
+      </p:sp>
+      <p:sp>
+        <p:nvSpPr>
+          <p:cNvPr id="49" name="四角形: 角を丸くする 4">
+            <a:extLst>
+              <a:ext uri="{FF2B5EF4-FFF2-40B4-BE49-F238E27FC236}">
+                <a16:creationId xmlns:a16="http://schemas.microsoft.com/office/drawing/2014/main" id="{8BB928BF-619E-4646-B07E-2BA747CE1CC3}"/>
+              </a:ext>
+            </a:extLst>
+          </p:cNvPr>
+          <p:cNvSpPr/>
+          <p:nvPr/>
+        </p:nvSpPr>
+        <p:spPr>
+          <a:xfrm>
+            <a:off x="1645439" y="1046996"/>
+            <a:ext cx="2112728" cy="824718"/>
+          </a:xfrm>
+          <a:prstGeom prst="roundRect">
+            <a:avLst/>
+          </a:prstGeom>
+          <a:solidFill>
+            <a:schemeClr val="bg1"/>
+          </a:solidFill>
+          <a:ln w="38100"/>
+        </p:spPr>
+        <p:style>
+          <a:lnRef idx="2">
+            <a:schemeClr val="accent1"/>
+          </a:lnRef>
+          <a:fillRef idx="1">
+            <a:schemeClr val="lt1"/>
+          </a:fillRef>
+          <a:effectRef idx="0">
+            <a:schemeClr val="accent1"/>
+          </a:effectRef>
+          <a:fontRef idx="minor">
+            <a:schemeClr val="dk1"/>
+          </a:fontRef>
+        </p:style>
+        <p:txBody>
+          <a:bodyPr rtlCol="0" anchor="ctr"/>
+          <a:lstStyle/>
+          <a:p>
+            <a:pPr algn="ctr"/>
+            <a:r>
+              <a:rPr kumimoji="1" lang="en-US" altLang="ja-JP" b="1" dirty="0">
+                <a:solidFill>
+                  <a:srgbClr val="7030A0"/>
+                </a:solidFill>
+              </a:rPr>
+              <a:t>1) Generate Key Pair for Encryption</a:t>
+            </a:r>
+          </a:p>
+        </p:txBody>
+      </p:sp>
+      <p:sp>
+        <p:nvSpPr>
+          <p:cNvPr id="50" name="四角形: 角を丸くする 4">
+            <a:extLst>
+              <a:ext uri="{FF2B5EF4-FFF2-40B4-BE49-F238E27FC236}">
+                <a16:creationId xmlns:a16="http://schemas.microsoft.com/office/drawing/2014/main" id="{E238C371-8D6C-2740-85A1-FBF3E7812E4B}"/>
+              </a:ext>
+            </a:extLst>
+          </p:cNvPr>
+          <p:cNvSpPr/>
+          <p:nvPr/>
+        </p:nvSpPr>
+        <p:spPr>
+          <a:xfrm>
+            <a:off x="449508" y="5569119"/>
+            <a:ext cx="2072816" cy="824718"/>
+          </a:xfrm>
+          <a:prstGeom prst="roundRect">
+            <a:avLst/>
+          </a:prstGeom>
+          <a:solidFill>
+            <a:schemeClr val="accent2">
+              <a:lumMod val="20000"/>
+              <a:lumOff val="80000"/>
+            </a:schemeClr>
+          </a:solidFill>
+          <a:ln w="38100"/>
+        </p:spPr>
+        <p:style>
+          <a:lnRef idx="2">
+            <a:schemeClr val="accent1"/>
+          </a:lnRef>
+          <a:fillRef idx="1">
+            <a:schemeClr val="lt1"/>
+          </a:fillRef>
+          <a:effectRef idx="0">
+            <a:schemeClr val="accent1"/>
+          </a:effectRef>
+          <a:fontRef idx="minor">
+            <a:schemeClr val="dk1"/>
+          </a:fontRef>
+        </p:style>
+        <p:txBody>
+          <a:bodyPr rtlCol="0" anchor="ctr"/>
+          <a:lstStyle/>
+          <a:p>
+            <a:pPr algn="ctr"/>
+            <a:r>
+              <a:rPr kumimoji="1" lang="en-US" altLang="ja-JP" b="1" dirty="0">
+                <a:solidFill>
+                  <a:schemeClr val="tx1"/>
+                </a:solidFill>
+              </a:rPr>
+              <a:t>5) AES-Decrypt and Check </a:t>
+            </a:r>
+            <a:r>
+              <a:rPr kumimoji="1" lang="en-US" altLang="ja-JP" b="1" dirty="0">
+                <a:solidFill>
+                  <a:srgbClr val="FF0000"/>
+                </a:solidFill>
+              </a:rPr>
+              <a:t>HMAC</a:t>
+            </a:r>
+            <a:r>
+              <a:rPr kumimoji="1" lang="en-US" altLang="ja-JP" b="1" dirty="0">
+                <a:solidFill>
+                  <a:schemeClr val="tx1"/>
+                </a:solidFill>
+              </a:rPr>
+              <a:t>!</a:t>
+            </a:r>
+          </a:p>
+        </p:txBody>
+      </p:sp>
+      <p:sp>
+        <p:nvSpPr>
+          <p:cNvPr id="52" name="Horizontal Scroll 51">
+            <a:extLst>
+              <a:ext uri="{FF2B5EF4-FFF2-40B4-BE49-F238E27FC236}">
+                <a16:creationId xmlns:a16="http://schemas.microsoft.com/office/drawing/2014/main" id="{B935B77D-EDA7-C949-AE08-27B38EB5D434}"/>
+              </a:ext>
+            </a:extLst>
+          </p:cNvPr>
+          <p:cNvSpPr/>
+          <p:nvPr/>
+        </p:nvSpPr>
+        <p:spPr>
+          <a:xfrm>
+            <a:off x="8080631" y="2376813"/>
+            <a:ext cx="580935" cy="409972"/>
+          </a:xfrm>
+          <a:prstGeom prst="horizontalScroll">
+            <a:avLst/>
+          </a:prstGeom>
+          <a:solidFill>
+            <a:schemeClr val="accent4">
+              <a:lumMod val="20000"/>
+              <a:lumOff val="80000"/>
+            </a:schemeClr>
+          </a:solidFill>
+        </p:spPr>
+        <p:style>
+          <a:lnRef idx="2">
+            <a:schemeClr val="accent1">
+              <a:shade val="50000"/>
+            </a:schemeClr>
+          </a:lnRef>
+          <a:fillRef idx="1">
+            <a:schemeClr val="accent1"/>
+          </a:fillRef>
+          <a:effectRef idx="0">
+            <a:schemeClr val="accent1"/>
+          </a:effectRef>
+          <a:fontRef idx="minor">
+            <a:schemeClr val="lt1"/>
+          </a:fontRef>
+        </p:style>
+        <p:txBody>
+          <a:bodyPr rtlCol="0" anchor="ctr"/>
+          <a:lstStyle/>
+          <a:p>
+            <a:pPr algn="ctr"/>
+            <a:r>
+              <a:rPr lang="en-US" sz="1400" b="1" dirty="0">
+                <a:solidFill>
+                  <a:schemeClr val="tx1"/>
+                </a:solidFill>
+              </a:rPr>
+              <a:t>Sig</a:t>
+            </a:r>
+          </a:p>
+        </p:txBody>
+      </p:sp>
+      <p:sp>
+        <p:nvSpPr>
+          <p:cNvPr id="53" name="Horizontal Scroll 52">
+            <a:extLst>
+              <a:ext uri="{FF2B5EF4-FFF2-40B4-BE49-F238E27FC236}">
+                <a16:creationId xmlns:a16="http://schemas.microsoft.com/office/drawing/2014/main" id="{FB35BF63-EFB1-344A-9354-CD0B4F04D6FC}"/>
+              </a:ext>
+            </a:extLst>
+          </p:cNvPr>
+          <p:cNvSpPr/>
+          <p:nvPr/>
+        </p:nvSpPr>
+        <p:spPr>
+          <a:xfrm>
+            <a:off x="2735460" y="2445045"/>
+            <a:ext cx="580935" cy="409972"/>
+          </a:xfrm>
+          <a:prstGeom prst="horizontalScroll">
+            <a:avLst/>
+          </a:prstGeom>
+          <a:solidFill>
+            <a:schemeClr val="accent2">
+              <a:lumMod val="20000"/>
+              <a:lumOff val="80000"/>
+            </a:schemeClr>
+          </a:solidFill>
+        </p:spPr>
+        <p:style>
+          <a:lnRef idx="2">
+            <a:schemeClr val="accent1">
+              <a:shade val="50000"/>
+            </a:schemeClr>
+          </a:lnRef>
+          <a:fillRef idx="1">
+            <a:schemeClr val="accent1"/>
+          </a:fillRef>
+          <a:effectRef idx="0">
+            <a:schemeClr val="accent1"/>
+          </a:effectRef>
+          <a:fontRef idx="minor">
+            <a:schemeClr val="lt1"/>
+          </a:fontRef>
+        </p:style>
+        <p:txBody>
+          <a:bodyPr rtlCol="0" anchor="ctr"/>
+          <a:lstStyle/>
+          <a:p>
+            <a:pPr algn="ctr"/>
+            <a:r>
+              <a:rPr lang="en-US" sz="1400" b="1" dirty="0">
+                <a:solidFill>
+                  <a:schemeClr val="tx1"/>
+                </a:solidFill>
+              </a:rPr>
+              <a:t>Sig</a:t>
+            </a:r>
+          </a:p>
+        </p:txBody>
+      </p:sp>
+      <p:sp>
+        <p:nvSpPr>
+          <p:cNvPr id="54" name="Horizontal Scroll 53">
+            <a:extLst>
+              <a:ext uri="{FF2B5EF4-FFF2-40B4-BE49-F238E27FC236}">
+                <a16:creationId xmlns:a16="http://schemas.microsoft.com/office/drawing/2014/main" id="{E8112F8E-483B-DF44-A462-CB47ECB90965}"/>
+              </a:ext>
+            </a:extLst>
+          </p:cNvPr>
+          <p:cNvSpPr/>
+          <p:nvPr/>
+        </p:nvSpPr>
+        <p:spPr>
+          <a:xfrm>
+            <a:off x="7531763" y="3263499"/>
+            <a:ext cx="580935" cy="409972"/>
+          </a:xfrm>
+          <a:prstGeom prst="horizontalScroll">
+            <a:avLst/>
+          </a:prstGeom>
+          <a:solidFill>
+            <a:schemeClr val="accent2">
+              <a:lumMod val="20000"/>
+              <a:lumOff val="80000"/>
+            </a:schemeClr>
+          </a:solidFill>
+        </p:spPr>
+        <p:style>
+          <a:lnRef idx="2">
+            <a:schemeClr val="accent1">
+              <a:shade val="50000"/>
+            </a:schemeClr>
+          </a:lnRef>
+          <a:fillRef idx="1">
+            <a:schemeClr val="accent1"/>
+          </a:fillRef>
+          <a:effectRef idx="0">
+            <a:schemeClr val="accent1"/>
+          </a:effectRef>
+          <a:fontRef idx="minor">
+            <a:schemeClr val="lt1"/>
+          </a:fontRef>
+        </p:style>
+        <p:txBody>
+          <a:bodyPr rtlCol="0" anchor="ctr"/>
+          <a:lstStyle/>
+          <a:p>
+            <a:pPr algn="ctr"/>
+            <a:r>
+              <a:rPr lang="en-US" sz="1400" b="1" dirty="0">
+                <a:solidFill>
+                  <a:schemeClr val="tx1"/>
+                </a:solidFill>
+              </a:rPr>
+              <a:t>Sig</a:t>
+            </a:r>
+          </a:p>
+        </p:txBody>
+      </p:sp>
+      <p:sp>
+        <p:nvSpPr>
+          <p:cNvPr id="55" name="Horizontal Scroll 54">
+            <a:extLst>
+              <a:ext uri="{FF2B5EF4-FFF2-40B4-BE49-F238E27FC236}">
+                <a16:creationId xmlns:a16="http://schemas.microsoft.com/office/drawing/2014/main" id="{16B19253-591B-7545-BB83-BB83A172D71C}"/>
+              </a:ext>
+            </a:extLst>
+          </p:cNvPr>
+          <p:cNvSpPr/>
+          <p:nvPr/>
+        </p:nvSpPr>
+        <p:spPr>
+          <a:xfrm>
+            <a:off x="3296726" y="3176666"/>
+            <a:ext cx="580935" cy="409972"/>
+          </a:xfrm>
+          <a:prstGeom prst="horizontalScroll">
+            <a:avLst/>
+          </a:prstGeom>
+          <a:solidFill>
+            <a:schemeClr val="accent4">
+              <a:lumMod val="20000"/>
+              <a:lumOff val="80000"/>
+            </a:schemeClr>
+          </a:solidFill>
+        </p:spPr>
+        <p:style>
+          <a:lnRef idx="2">
+            <a:schemeClr val="accent1">
+              <a:shade val="50000"/>
+            </a:schemeClr>
+          </a:lnRef>
+          <a:fillRef idx="1">
+            <a:schemeClr val="accent1"/>
+          </a:fillRef>
+          <a:effectRef idx="0">
+            <a:schemeClr val="accent1"/>
+          </a:effectRef>
+          <a:fontRef idx="minor">
+            <a:schemeClr val="lt1"/>
+          </a:fontRef>
+        </p:style>
+        <p:txBody>
+          <a:bodyPr rtlCol="0" anchor="ctr"/>
+          <a:lstStyle/>
+          <a:p>
+            <a:pPr algn="ctr"/>
+            <a:r>
+              <a:rPr lang="en-US" sz="1400" b="1" dirty="0">
+                <a:solidFill>
+                  <a:schemeClr val="tx1"/>
+                </a:solidFill>
+              </a:rPr>
+              <a:t>Sig</a:t>
+            </a:r>
+          </a:p>
+        </p:txBody>
+      </p:sp>
+    </p:spTree>
+    <p:extLst>
+      <p:ext uri="{BB962C8B-B14F-4D97-AF65-F5344CB8AC3E}">
+        <p14:creationId xmlns:p14="http://schemas.microsoft.com/office/powerpoint/2010/main" val="2071803598"/>
       </p:ext>
     </p:extLst>
   </p:cSld>

</xml_diff>